<commit_message>
update slides for 20210119 rotation meeting.
</commit_message>
<xml_diff>
--- a/Summary/20210118_demo_for_ccgb_rotation_update.pptx
+++ b/Summary/20210118_demo_for_ccgb_rotation_update.pptx
@@ -5,7 +5,7 @@
     <p:sldMasterId id="2147483648" r:id="rId1"/>
   </p:sldMasterIdLst>
   <p:notesMasterIdLst>
-    <p:notesMasterId r:id="rId13"/>
+    <p:notesMasterId r:id="rId15"/>
   </p:notesMasterIdLst>
   <p:sldIdLst>
     <p:sldId id="256" r:id="rId2"/>
@@ -14,11 +14,13 @@
     <p:sldId id="288" r:id="rId5"/>
     <p:sldId id="290" r:id="rId6"/>
     <p:sldId id="291" r:id="rId7"/>
-    <p:sldId id="292" r:id="rId8"/>
+    <p:sldId id="295" r:id="rId8"/>
     <p:sldId id="293" r:id="rId9"/>
-    <p:sldId id="294" r:id="rId10"/>
-    <p:sldId id="278" r:id="rId11"/>
-    <p:sldId id="273" r:id="rId12"/>
+    <p:sldId id="292" r:id="rId10"/>
+    <p:sldId id="294" r:id="rId11"/>
+    <p:sldId id="296" r:id="rId12"/>
+    <p:sldId id="278" r:id="rId13"/>
+    <p:sldId id="273" r:id="rId14"/>
   </p:sldIdLst>
   <p:sldSz cx="12192000" cy="6858000"/>
   <p:notesSz cx="6858000" cy="9144000"/>
@@ -128,9 +130,11 @@
             <p14:sldId id="288"/>
             <p14:sldId id="290"/>
             <p14:sldId id="291"/>
+            <p14:sldId id="295"/>
+            <p14:sldId id="293"/>
             <p14:sldId id="292"/>
-            <p14:sldId id="293"/>
             <p14:sldId id="294"/>
+            <p14:sldId id="296"/>
             <p14:sldId id="278"/>
             <p14:sldId id="273"/>
           </p14:sldIdLst>
@@ -726,7 +730,7 @@
           <a:p>
             <a:fld id="{9D984E8B-8157-4976-ABDF-6DA2CAC3440F}" type="slidenum">
               <a:rPr lang="en-US" smtClean="0"/>
-              <a:t>10</a:t>
+              <a:t>12</a:t>
             </a:fld>
             <a:endParaRPr lang="en-US"/>
           </a:p>
@@ -4037,7 +4041,7 @@
                 <a:latin typeface="Yu Gothic" panose="020B0400000000000000" pitchFamily="34" charset="-128"/>
                 <a:ea typeface="Yu Gothic" panose="020B0400000000000000" pitchFamily="34" charset="-128"/>
               </a:rPr>
-              <a:t>20210111</a:t>
+              <a:t>20210118</a:t>
             </a:r>
           </a:p>
           <a:p>
@@ -4120,6 +4124,1408 @@
           <p:cNvPr id="2" name="Title 1">
             <a:extLst>
               <a:ext uri="{FF2B5EF4-FFF2-40B4-BE49-F238E27FC236}">
+                <a16:creationId xmlns:a16="http://schemas.microsoft.com/office/drawing/2014/main" id="{FC0C9624-1DBB-4B7A-B446-0EC6DD7756EB}"/>
+              </a:ext>
+            </a:extLst>
+          </p:cNvPr>
+          <p:cNvSpPr>
+            <a:spLocks noGrp="1"/>
+          </p:cNvSpPr>
+          <p:nvPr>
+            <p:ph type="title"/>
+          </p:nvPr>
+        </p:nvSpPr>
+        <p:spPr/>
+        <p:txBody>
+          <a:bodyPr/>
+          <a:lstStyle/>
+          <a:p>
+            <a:r>
+              <a:rPr lang="en-US" dirty="0"/>
+              <a:t>Bacteroides </a:t>
+            </a:r>
+            <a:r>
+              <a:rPr lang="en-US" dirty="0" err="1"/>
+              <a:t>uniformis</a:t>
+            </a:r>
+            <a:endParaRPr lang="en-US" dirty="0"/>
+          </a:p>
+        </p:txBody>
+      </p:sp>
+      <p:pic>
+        <p:nvPicPr>
+          <p:cNvPr id="4" name="Picture 3">
+            <a:extLst>
+              <a:ext uri="{FF2B5EF4-FFF2-40B4-BE49-F238E27FC236}">
+                <a16:creationId xmlns:a16="http://schemas.microsoft.com/office/drawing/2014/main" id="{296A8C86-B04D-4B61-8B9F-1C02B8E771FF}"/>
+              </a:ext>
+            </a:extLst>
+          </p:cNvPr>
+          <p:cNvPicPr>
+            <a:picLocks noChangeAspect="1"/>
+          </p:cNvPicPr>
+          <p:nvPr/>
+        </p:nvPicPr>
+        <p:blipFill>
+          <a:blip r:embed="rId2"/>
+          <a:stretch>
+            <a:fillRect/>
+          </a:stretch>
+        </p:blipFill>
+        <p:spPr>
+          <a:xfrm>
+            <a:off x="460887" y="1393389"/>
+            <a:ext cx="7541342" cy="3131133"/>
+          </a:xfrm>
+          <a:prstGeom prst="rect">
+            <a:avLst/>
+          </a:prstGeom>
+        </p:spPr>
+      </p:pic>
+      <p:graphicFrame>
+        <p:nvGraphicFramePr>
+          <p:cNvPr id="6" name="Table 4">
+            <a:extLst>
+              <a:ext uri="{FF2B5EF4-FFF2-40B4-BE49-F238E27FC236}">
+                <a16:creationId xmlns:a16="http://schemas.microsoft.com/office/drawing/2014/main" id="{D44A6905-343D-4A93-B937-9CF13DA5DFC3}"/>
+              </a:ext>
+            </a:extLst>
+          </p:cNvPr>
+          <p:cNvGraphicFramePr>
+            <a:graphicFrameLocks noGrp="1"/>
+          </p:cNvGraphicFramePr>
+          <p:nvPr>
+            <p:ph idx="1"/>
+            <p:extLst>
+              <p:ext uri="{D42A27DB-BD31-4B8C-83A1-F6EECF244321}">
+                <p14:modId xmlns:p14="http://schemas.microsoft.com/office/powerpoint/2010/main" val="830082323"/>
+              </p:ext>
+            </p:extLst>
+          </p:nvPr>
+        </p:nvGraphicFramePr>
+        <p:xfrm>
+          <a:off x="838200" y="4524522"/>
+          <a:ext cx="10515600" cy="2225040"/>
+        </p:xfrm>
+        <a:graphic>
+          <a:graphicData uri="http://schemas.openxmlformats.org/drawingml/2006/table">
+            <a:tbl>
+              <a:tblPr firstRow="1" bandRow="1">
+                <a:tableStyleId>{073A0DAA-6AF3-43AB-8588-CEC1D06C72B9}</a:tableStyleId>
+              </a:tblPr>
+              <a:tblGrid>
+                <a:gridCol w="2103120">
+                  <a:extLst>
+                    <a:ext uri="{9D8B030D-6E8A-4147-A177-3AD203B41FA5}">
+                      <a16:colId xmlns:a16="http://schemas.microsoft.com/office/drawing/2014/main" val="2900726404"/>
+                    </a:ext>
+                  </a:extLst>
+                </a:gridCol>
+                <a:gridCol w="2103120">
+                  <a:extLst>
+                    <a:ext uri="{9D8B030D-6E8A-4147-A177-3AD203B41FA5}">
+                      <a16:colId xmlns:a16="http://schemas.microsoft.com/office/drawing/2014/main" val="2297780930"/>
+                    </a:ext>
+                  </a:extLst>
+                </a:gridCol>
+                <a:gridCol w="2103120">
+                  <a:extLst>
+                    <a:ext uri="{9D8B030D-6E8A-4147-A177-3AD203B41FA5}">
+                      <a16:colId xmlns:a16="http://schemas.microsoft.com/office/drawing/2014/main" val="1352057416"/>
+                    </a:ext>
+                  </a:extLst>
+                </a:gridCol>
+                <a:gridCol w="2103120">
+                  <a:extLst>
+                    <a:ext uri="{9D8B030D-6E8A-4147-A177-3AD203B41FA5}">
+                      <a16:colId xmlns:a16="http://schemas.microsoft.com/office/drawing/2014/main" val="1457082074"/>
+                    </a:ext>
+                  </a:extLst>
+                </a:gridCol>
+                <a:gridCol w="2103120">
+                  <a:extLst>
+                    <a:ext uri="{9D8B030D-6E8A-4147-A177-3AD203B41FA5}">
+                      <a16:colId xmlns:a16="http://schemas.microsoft.com/office/drawing/2014/main" val="633438695"/>
+                    </a:ext>
+                  </a:extLst>
+                </a:gridCol>
+              </a:tblGrid>
+              <a:tr h="370840">
+                <a:tc>
+                  <a:txBody>
+                    <a:bodyPr/>
+                    <a:lstStyle/>
+                    <a:p>
+                      <a:r>
+                        <a:rPr lang="en-US" dirty="0"/>
+                        <a:t>Model</a:t>
+                      </a:r>
+                    </a:p>
+                  </a:txBody>
+                  <a:tcPr/>
+                </a:tc>
+                <a:tc>
+                  <a:txBody>
+                    <a:bodyPr/>
+                    <a:lstStyle/>
+                    <a:p>
+                      <a:r>
+                        <a:rPr lang="en-US" dirty="0"/>
+                        <a:t>Exponential growth</a:t>
+                      </a:r>
+                    </a:p>
+                  </a:txBody>
+                  <a:tcPr/>
+                </a:tc>
+                <a:tc>
+                  <a:txBody>
+                    <a:bodyPr/>
+                    <a:lstStyle/>
+                    <a:p>
+                      <a:r>
+                        <a:rPr lang="en-US" dirty="0"/>
+                        <a:t>Two-epoch</a:t>
+                      </a:r>
+                    </a:p>
+                  </a:txBody>
+                  <a:tcPr/>
+                </a:tc>
+                <a:tc>
+                  <a:txBody>
+                    <a:bodyPr/>
+                    <a:lstStyle/>
+                    <a:p>
+                      <a:r>
+                        <a:rPr lang="en-US" dirty="0"/>
+                        <a:t>Bottleneck + growth</a:t>
+                      </a:r>
+                    </a:p>
+                  </a:txBody>
+                  <a:tcPr/>
+                </a:tc>
+                <a:tc>
+                  <a:txBody>
+                    <a:bodyPr/>
+                    <a:lstStyle/>
+                    <a:p>
+                      <a:r>
+                        <a:rPr lang="en-US" dirty="0"/>
+                        <a:t>Three-epoch</a:t>
+                      </a:r>
+                    </a:p>
+                  </a:txBody>
+                  <a:tcPr/>
+                </a:tc>
+                <a:extLst>
+                  <a:ext uri="{0D108BD9-81ED-4DB2-BD59-A6C34878D82A}">
+                    <a16:rowId xmlns:a16="http://schemas.microsoft.com/office/drawing/2014/main" val="3143057051"/>
+                  </a:ext>
+                </a:extLst>
+              </a:tr>
+              <a:tr h="370840">
+                <a:tc>
+                  <a:txBody>
+                    <a:bodyPr/>
+                    <a:lstStyle/>
+                    <a:p>
+                      <a:r>
+                        <a:rPr lang="en-US" dirty="0"/>
+                        <a:t>Log Likelihood</a:t>
+                      </a:r>
+                    </a:p>
+                  </a:txBody>
+                  <a:tcPr/>
+                </a:tc>
+                <a:tc>
+                  <a:txBody>
+                    <a:bodyPr/>
+                    <a:lstStyle/>
+                    <a:p>
+                      <a:r>
+                        <a:rPr lang="en-US" dirty="0"/>
+                        <a:t>-399.504374725</a:t>
+                      </a:r>
+                    </a:p>
+                  </a:txBody>
+                  <a:tcPr/>
+                </a:tc>
+                <a:tc>
+                  <a:txBody>
+                    <a:bodyPr/>
+                    <a:lstStyle/>
+                    <a:p>
+                      <a:r>
+                        <a:rPr lang="en-US" dirty="0"/>
+                        <a:t>-232.981268472</a:t>
+                      </a:r>
+                    </a:p>
+                  </a:txBody>
+                  <a:tcPr/>
+                </a:tc>
+                <a:tc>
+                  <a:txBody>
+                    <a:bodyPr/>
+                    <a:lstStyle/>
+                    <a:p>
+                      <a:r>
+                        <a:rPr lang="en-US" dirty="0"/>
+                        <a:t>-220.698891194</a:t>
+                      </a:r>
+                      <a:endParaRPr lang="en-US" dirty="0">
+                        <a:highlight>
+                          <a:srgbClr val="FFFF00"/>
+                        </a:highlight>
+                      </a:endParaRPr>
+                    </a:p>
+                  </a:txBody>
+                  <a:tcPr/>
+                </a:tc>
+                <a:tc>
+                  <a:txBody>
+                    <a:bodyPr/>
+                    <a:lstStyle/>
+                    <a:p>
+                      <a:r>
+                        <a:rPr lang="en-US" dirty="0">
+                          <a:highlight>
+                            <a:srgbClr val="FFFF00"/>
+                          </a:highlight>
+                        </a:rPr>
+                        <a:t>-232.890550466</a:t>
+                      </a:r>
+                    </a:p>
+                  </a:txBody>
+                  <a:tcPr/>
+                </a:tc>
+                <a:extLst>
+                  <a:ext uri="{0D108BD9-81ED-4DB2-BD59-A6C34878D82A}">
+                    <a16:rowId xmlns:a16="http://schemas.microsoft.com/office/drawing/2014/main" val="3235037204"/>
+                  </a:ext>
+                </a:extLst>
+              </a:tr>
+              <a:tr h="370840">
+                <a:tc>
+                  <a:txBody>
+                    <a:bodyPr/>
+                    <a:lstStyle/>
+                    <a:p>
+                      <a:r>
+                        <a:rPr lang="en-US" dirty="0" err="1"/>
+                        <a:t>Nu_a</a:t>
+                      </a:r>
+                      <a:endParaRPr lang="en-US" dirty="0"/>
+                    </a:p>
+                  </a:txBody>
+                  <a:tcPr/>
+                </a:tc>
+                <a:tc>
+                  <a:txBody>
+                    <a:bodyPr/>
+                    <a:lstStyle/>
+                    <a:p>
+                      <a:r>
+                        <a:rPr lang="en-US" dirty="0"/>
+                        <a:t>3.72253633e-01</a:t>
+                      </a:r>
+                    </a:p>
+                  </a:txBody>
+                  <a:tcPr/>
+                </a:tc>
+                <a:tc>
+                  <a:txBody>
+                    <a:bodyPr/>
+                    <a:lstStyle/>
+                    <a:p>
+                      <a:r>
+                        <a:rPr lang="en-US" dirty="0"/>
+                        <a:t>1.98374712</a:t>
+                      </a:r>
+                    </a:p>
+                  </a:txBody>
+                  <a:tcPr/>
+                </a:tc>
+                <a:tc>
+                  <a:txBody>
+                    <a:bodyPr/>
+                    <a:lstStyle/>
+                    <a:p>
+                      <a:r>
+                        <a:rPr lang="en-US" dirty="0"/>
+                        <a:t>1.40119388</a:t>
+                      </a:r>
+                    </a:p>
+                  </a:txBody>
+                  <a:tcPr/>
+                </a:tc>
+                <a:tc>
+                  <a:txBody>
+                    <a:bodyPr/>
+                    <a:lstStyle/>
+                    <a:p>
+                      <a:r>
+                        <a:rPr lang="en-US" dirty="0"/>
+                        <a:t>1.42262676</a:t>
+                      </a:r>
+                    </a:p>
+                  </a:txBody>
+                  <a:tcPr/>
+                </a:tc>
+                <a:extLst>
+                  <a:ext uri="{0D108BD9-81ED-4DB2-BD59-A6C34878D82A}">
+                    <a16:rowId xmlns:a16="http://schemas.microsoft.com/office/drawing/2014/main" val="2717148640"/>
+                  </a:ext>
+                </a:extLst>
+              </a:tr>
+              <a:tr h="370840">
+                <a:tc>
+                  <a:txBody>
+                    <a:bodyPr/>
+                    <a:lstStyle/>
+                    <a:p>
+                      <a:r>
+                        <a:rPr lang="en-US" dirty="0" err="1"/>
+                        <a:t>Nu_b</a:t>
+                      </a:r>
+                      <a:endParaRPr lang="en-US" dirty="0"/>
+                    </a:p>
+                  </a:txBody>
+                  <a:tcPr/>
+                </a:tc>
+                <a:tc>
+                  <a:txBody>
+                    <a:bodyPr/>
+                    <a:lstStyle/>
+                    <a:p>
+                      <a:r>
+                        <a:rPr lang="en-US" dirty="0"/>
+                        <a:t>N/A</a:t>
+                      </a:r>
+                    </a:p>
+                  </a:txBody>
+                  <a:tcPr/>
+                </a:tc>
+                <a:tc>
+                  <a:txBody>
+                    <a:bodyPr/>
+                    <a:lstStyle/>
+                    <a:p>
+                      <a:r>
+                        <a:rPr lang="en-US" dirty="0"/>
+                        <a:t>N/A</a:t>
+                      </a:r>
+                    </a:p>
+                  </a:txBody>
+                  <a:tcPr/>
+                </a:tc>
+                <a:tc>
+                  <a:txBody>
+                    <a:bodyPr/>
+                    <a:lstStyle/>
+                    <a:p>
+                      <a:r>
+                        <a:rPr lang="en-US" dirty="0"/>
+                        <a:t>1.81254464</a:t>
+                      </a:r>
+                    </a:p>
+                  </a:txBody>
+                  <a:tcPr/>
+                </a:tc>
+                <a:tc>
+                  <a:txBody>
+                    <a:bodyPr/>
+                    <a:lstStyle/>
+                    <a:p>
+                      <a:r>
+                        <a:rPr lang="en-US" dirty="0"/>
+                        <a:t>1.69965725</a:t>
+                      </a:r>
+                    </a:p>
+                  </a:txBody>
+                  <a:tcPr/>
+                </a:tc>
+                <a:extLst>
+                  <a:ext uri="{0D108BD9-81ED-4DB2-BD59-A6C34878D82A}">
+                    <a16:rowId xmlns:a16="http://schemas.microsoft.com/office/drawing/2014/main" val="3992781458"/>
+                  </a:ext>
+                </a:extLst>
+              </a:tr>
+              <a:tr h="370840">
+                <a:tc>
+                  <a:txBody>
+                    <a:bodyPr/>
+                    <a:lstStyle/>
+                    <a:p>
+                      <a:r>
+                        <a:rPr lang="en-US" dirty="0"/>
+                        <a:t>T_12</a:t>
+                      </a:r>
+                    </a:p>
+                  </a:txBody>
+                  <a:tcPr/>
+                </a:tc>
+                <a:tc>
+                  <a:txBody>
+                    <a:bodyPr/>
+                    <a:lstStyle/>
+                    <a:p>
+                      <a:r>
+                        <a:rPr lang="en-US" dirty="0"/>
+                        <a:t>5.84878255e-06</a:t>
+                      </a:r>
+                    </a:p>
+                  </a:txBody>
+                  <a:tcPr/>
+                </a:tc>
+                <a:tc>
+                  <a:txBody>
+                    <a:bodyPr/>
+                    <a:lstStyle/>
+                    <a:p>
+                      <a:r>
+                        <a:rPr lang="en-US" dirty="0"/>
+                        <a:t>0.0658422</a:t>
+                      </a:r>
+                    </a:p>
+                  </a:txBody>
+                  <a:tcPr/>
+                </a:tc>
+                <a:tc>
+                  <a:txBody>
+                    <a:bodyPr/>
+                    <a:lstStyle/>
+                    <a:p>
+                      <a:r>
+                        <a:rPr lang="en-US" dirty="0"/>
+                        <a:t>0.49713158</a:t>
+                      </a:r>
+                    </a:p>
+                  </a:txBody>
+                  <a:tcPr/>
+                </a:tc>
+                <a:tc>
+                  <a:txBody>
+                    <a:bodyPr/>
+                    <a:lstStyle/>
+                    <a:p>
+                      <a:r>
+                        <a:rPr lang="en-US" dirty="0"/>
+                        <a:t>0.04668702</a:t>
+                      </a:r>
+                    </a:p>
+                  </a:txBody>
+                  <a:tcPr/>
+                </a:tc>
+                <a:extLst>
+                  <a:ext uri="{0D108BD9-81ED-4DB2-BD59-A6C34878D82A}">
+                    <a16:rowId xmlns:a16="http://schemas.microsoft.com/office/drawing/2014/main" val="3283572519"/>
+                  </a:ext>
+                </a:extLst>
+              </a:tr>
+              <a:tr h="370840">
+                <a:tc>
+                  <a:txBody>
+                    <a:bodyPr/>
+                    <a:lstStyle/>
+                    <a:p>
+                      <a:r>
+                        <a:rPr lang="en-US" dirty="0"/>
+                        <a:t>T_23</a:t>
+                      </a:r>
+                    </a:p>
+                  </a:txBody>
+                  <a:tcPr/>
+                </a:tc>
+                <a:tc>
+                  <a:txBody>
+                    <a:bodyPr/>
+                    <a:lstStyle/>
+                    <a:p>
+                      <a:r>
+                        <a:rPr lang="en-US" dirty="0"/>
+                        <a:t>N/A</a:t>
+                      </a:r>
+                    </a:p>
+                  </a:txBody>
+                  <a:tcPr/>
+                </a:tc>
+                <a:tc>
+                  <a:txBody>
+                    <a:bodyPr/>
+                    <a:lstStyle/>
+                    <a:p>
+                      <a:r>
+                        <a:rPr lang="en-US" dirty="0"/>
+                        <a:t>N/A</a:t>
+                      </a:r>
+                    </a:p>
+                  </a:txBody>
+                  <a:tcPr/>
+                </a:tc>
+                <a:tc>
+                  <a:txBody>
+                    <a:bodyPr/>
+                    <a:lstStyle/>
+                    <a:p>
+                      <a:r>
+                        <a:rPr lang="en-US" dirty="0"/>
+                        <a:t>N/A</a:t>
+                      </a:r>
+                    </a:p>
+                  </a:txBody>
+                  <a:tcPr/>
+                </a:tc>
+                <a:tc>
+                  <a:txBody>
+                    <a:bodyPr/>
+                    <a:lstStyle/>
+                    <a:p>
+                      <a:r>
+                        <a:rPr lang="en-US" dirty="0"/>
+                        <a:t>0.15294058</a:t>
+                      </a:r>
+                    </a:p>
+                  </a:txBody>
+                  <a:tcPr/>
+                </a:tc>
+                <a:extLst>
+                  <a:ext uri="{0D108BD9-81ED-4DB2-BD59-A6C34878D82A}">
+                    <a16:rowId xmlns:a16="http://schemas.microsoft.com/office/drawing/2014/main" val="2422470866"/>
+                  </a:ext>
+                </a:extLst>
+              </a:tr>
+            </a:tbl>
+          </a:graphicData>
+        </a:graphic>
+      </p:graphicFrame>
+      <p:sp>
+        <p:nvSpPr>
+          <p:cNvPr id="7" name="TextBox 6">
+            <a:extLst>
+              <a:ext uri="{FF2B5EF4-FFF2-40B4-BE49-F238E27FC236}">
+                <a16:creationId xmlns:a16="http://schemas.microsoft.com/office/drawing/2014/main" id="{B6D0FC50-2775-4DB2-97A6-D086208F4375}"/>
+              </a:ext>
+            </a:extLst>
+          </p:cNvPr>
+          <p:cNvSpPr txBox="1"/>
+          <p:nvPr/>
+        </p:nvSpPr>
+        <p:spPr>
+          <a:xfrm>
+            <a:off x="7096453" y="1690688"/>
+            <a:ext cx="5095547" cy="1754326"/>
+          </a:xfrm>
+          <a:prstGeom prst="rect">
+            <a:avLst/>
+          </a:prstGeom>
+          <a:noFill/>
+        </p:spPr>
+        <p:txBody>
+          <a:bodyPr wrap="square" rtlCol="0">
+            <a:spAutoFit/>
+          </a:bodyPr>
+          <a:lstStyle/>
+          <a:p>
+            <a:pPr marL="285750" indent="-285750">
+              <a:buFont typeface="Arial" panose="020B0604020202020204" pitchFamily="34" charset="0"/>
+              <a:buChar char="•"/>
+            </a:pPr>
+            <a:r>
+              <a:rPr lang="en-US" dirty="0" err="1"/>
+              <a:t>Nu_a</a:t>
+            </a:r>
+            <a:r>
+              <a:rPr lang="en-US" dirty="0"/>
+              <a:t>: contemporary population relative to ancestral population before first epoch</a:t>
+            </a:r>
+          </a:p>
+          <a:p>
+            <a:pPr marL="285750" indent="-285750">
+              <a:buFont typeface="Arial" panose="020B0604020202020204" pitchFamily="34" charset="0"/>
+              <a:buChar char="•"/>
+            </a:pPr>
+            <a:r>
+              <a:rPr lang="en-US" dirty="0" err="1"/>
+              <a:t>Nu_b</a:t>
+            </a:r>
+            <a:r>
+              <a:rPr lang="en-US" dirty="0"/>
+              <a:t>: contemporary population relative to ancestral population before second epoch</a:t>
+            </a:r>
+          </a:p>
+          <a:p>
+            <a:pPr marL="285750" indent="-285750">
+              <a:buFont typeface="Arial" panose="020B0604020202020204" pitchFamily="34" charset="0"/>
+              <a:buChar char="•"/>
+            </a:pPr>
+            <a:r>
+              <a:rPr lang="en-US" dirty="0"/>
+              <a:t>T_1: Duration of first epoch (units of 2 * </a:t>
+            </a:r>
+            <a:r>
+              <a:rPr lang="en-US" dirty="0" err="1"/>
+              <a:t>N_a</a:t>
+            </a:r>
+            <a:r>
+              <a:rPr lang="en-US" dirty="0"/>
+              <a:t>)</a:t>
+            </a:r>
+          </a:p>
+          <a:p>
+            <a:pPr marL="285750" indent="-285750">
+              <a:buFont typeface="Arial" panose="020B0604020202020204" pitchFamily="34" charset="0"/>
+              <a:buChar char="•"/>
+            </a:pPr>
+            <a:r>
+              <a:rPr lang="en-US" dirty="0"/>
+              <a:t>T_2: Duration of second epoch (units of 2 * </a:t>
+            </a:r>
+            <a:r>
+              <a:rPr lang="en-US" dirty="0" err="1"/>
+              <a:t>N_a</a:t>
+            </a:r>
+            <a:r>
+              <a:rPr lang="en-US" dirty="0"/>
+              <a:t>)</a:t>
+            </a:r>
+          </a:p>
+        </p:txBody>
+      </p:sp>
+    </p:spTree>
+    <p:extLst>
+      <p:ext uri="{BB962C8B-B14F-4D97-AF65-F5344CB8AC3E}">
+        <p14:creationId xmlns:p14="http://schemas.microsoft.com/office/powerpoint/2010/main" val="916713409"/>
+      </p:ext>
+    </p:extLst>
+  </p:cSld>
+  <p:clrMapOvr>
+    <a:masterClrMapping/>
+  </p:clrMapOvr>
+</p:sld>
+</file>
+
+<file path=ppt/slides/slide11.xml><?xml version="1.0" encoding="utf-8"?>
+<p:sld xmlns:a="http://schemas.openxmlformats.org/drawingml/2006/main" xmlns:r="http://schemas.openxmlformats.org/officeDocument/2006/relationships" xmlns:p="http://schemas.openxmlformats.org/presentationml/2006/main">
+  <p:cSld>
+    <p:spTree>
+      <p:nvGrpSpPr>
+        <p:cNvPr id="1" name=""/>
+        <p:cNvGrpSpPr/>
+        <p:nvPr/>
+      </p:nvGrpSpPr>
+      <p:grpSpPr>
+        <a:xfrm>
+          <a:off x="0" y="0"/>
+          <a:ext cx="0" cy="0"/>
+          <a:chOff x="0" y="0"/>
+          <a:chExt cx="0" cy="0"/>
+        </a:xfrm>
+      </p:grpSpPr>
+      <p:sp>
+        <p:nvSpPr>
+          <p:cNvPr id="2" name="Title 1">
+            <a:extLst>
+              <a:ext uri="{FF2B5EF4-FFF2-40B4-BE49-F238E27FC236}">
+                <a16:creationId xmlns:a16="http://schemas.microsoft.com/office/drawing/2014/main" id="{FC0C9624-1DBB-4B7A-B446-0EC6DD7756EB}"/>
+              </a:ext>
+            </a:extLst>
+          </p:cNvPr>
+          <p:cNvSpPr>
+            <a:spLocks noGrp="1"/>
+          </p:cNvSpPr>
+          <p:nvPr>
+            <p:ph type="title"/>
+          </p:nvPr>
+        </p:nvSpPr>
+        <p:spPr/>
+        <p:txBody>
+          <a:bodyPr/>
+          <a:lstStyle/>
+          <a:p>
+            <a:r>
+              <a:rPr lang="en-US" dirty="0"/>
+              <a:t>Eubacterium </a:t>
+            </a:r>
+            <a:r>
+              <a:rPr lang="en-US" dirty="0" err="1"/>
+              <a:t>rectale</a:t>
+            </a:r>
+            <a:endParaRPr lang="en-US" dirty="0"/>
+          </a:p>
+        </p:txBody>
+      </p:sp>
+      <p:pic>
+        <p:nvPicPr>
+          <p:cNvPr id="4" name="Picture 3">
+            <a:extLst>
+              <a:ext uri="{FF2B5EF4-FFF2-40B4-BE49-F238E27FC236}">
+                <a16:creationId xmlns:a16="http://schemas.microsoft.com/office/drawing/2014/main" id="{30B4062A-D74F-4548-A313-D966B06F6AD1}"/>
+              </a:ext>
+            </a:extLst>
+          </p:cNvPr>
+          <p:cNvPicPr>
+            <a:picLocks noChangeAspect="1"/>
+          </p:cNvPicPr>
+          <p:nvPr/>
+        </p:nvPicPr>
+        <p:blipFill>
+          <a:blip r:embed="rId2"/>
+          <a:stretch>
+            <a:fillRect/>
+          </a:stretch>
+        </p:blipFill>
+        <p:spPr>
+          <a:xfrm>
+            <a:off x="673685" y="1365888"/>
+            <a:ext cx="6422768" cy="2622168"/>
+          </a:xfrm>
+          <a:prstGeom prst="rect">
+            <a:avLst/>
+          </a:prstGeom>
+        </p:spPr>
+      </p:pic>
+      <p:sp>
+        <p:nvSpPr>
+          <p:cNvPr id="6" name="TextBox 5">
+            <a:extLst>
+              <a:ext uri="{FF2B5EF4-FFF2-40B4-BE49-F238E27FC236}">
+                <a16:creationId xmlns:a16="http://schemas.microsoft.com/office/drawing/2014/main" id="{800B2470-8A14-490B-8A6D-A41088728B65}"/>
+              </a:ext>
+            </a:extLst>
+          </p:cNvPr>
+          <p:cNvSpPr txBox="1"/>
+          <p:nvPr/>
+        </p:nvSpPr>
+        <p:spPr>
+          <a:xfrm>
+            <a:off x="7096453" y="1690688"/>
+            <a:ext cx="5095547" cy="1754326"/>
+          </a:xfrm>
+          <a:prstGeom prst="rect">
+            <a:avLst/>
+          </a:prstGeom>
+          <a:noFill/>
+        </p:spPr>
+        <p:txBody>
+          <a:bodyPr wrap="square" rtlCol="0">
+            <a:spAutoFit/>
+          </a:bodyPr>
+          <a:lstStyle/>
+          <a:p>
+            <a:pPr marL="285750" indent="-285750">
+              <a:buFont typeface="Arial" panose="020B0604020202020204" pitchFamily="34" charset="0"/>
+              <a:buChar char="•"/>
+            </a:pPr>
+            <a:r>
+              <a:rPr lang="en-US" dirty="0" err="1"/>
+              <a:t>Nu_a</a:t>
+            </a:r>
+            <a:r>
+              <a:rPr lang="en-US" dirty="0"/>
+              <a:t>: contemporary population relative to ancestral population before first epoch</a:t>
+            </a:r>
+          </a:p>
+          <a:p>
+            <a:pPr marL="285750" indent="-285750">
+              <a:buFont typeface="Arial" panose="020B0604020202020204" pitchFamily="34" charset="0"/>
+              <a:buChar char="•"/>
+            </a:pPr>
+            <a:r>
+              <a:rPr lang="en-US" dirty="0" err="1"/>
+              <a:t>Nu_b</a:t>
+            </a:r>
+            <a:r>
+              <a:rPr lang="en-US" dirty="0"/>
+              <a:t>: contemporary population relative to ancestral population before second epoch</a:t>
+            </a:r>
+          </a:p>
+          <a:p>
+            <a:pPr marL="285750" indent="-285750">
+              <a:buFont typeface="Arial" panose="020B0604020202020204" pitchFamily="34" charset="0"/>
+              <a:buChar char="•"/>
+            </a:pPr>
+            <a:r>
+              <a:rPr lang="en-US" dirty="0"/>
+              <a:t>T_1: Duration of first epoch (units of 2 * </a:t>
+            </a:r>
+            <a:r>
+              <a:rPr lang="en-US" dirty="0" err="1"/>
+              <a:t>N_a</a:t>
+            </a:r>
+            <a:r>
+              <a:rPr lang="en-US" dirty="0"/>
+              <a:t>)</a:t>
+            </a:r>
+          </a:p>
+          <a:p>
+            <a:pPr marL="285750" indent="-285750">
+              <a:buFont typeface="Arial" panose="020B0604020202020204" pitchFamily="34" charset="0"/>
+              <a:buChar char="•"/>
+            </a:pPr>
+            <a:r>
+              <a:rPr lang="en-US" dirty="0"/>
+              <a:t>T_2: Duration of second epoch (units of 2 * </a:t>
+            </a:r>
+            <a:r>
+              <a:rPr lang="en-US" dirty="0" err="1"/>
+              <a:t>N_a</a:t>
+            </a:r>
+            <a:r>
+              <a:rPr lang="en-US" dirty="0"/>
+              <a:t>)</a:t>
+            </a:r>
+          </a:p>
+        </p:txBody>
+      </p:sp>
+      <p:graphicFrame>
+        <p:nvGraphicFramePr>
+          <p:cNvPr id="7" name="Table 4">
+            <a:extLst>
+              <a:ext uri="{FF2B5EF4-FFF2-40B4-BE49-F238E27FC236}">
+                <a16:creationId xmlns:a16="http://schemas.microsoft.com/office/drawing/2014/main" id="{06D0BF44-F2DB-436F-AFA0-8D66714183F7}"/>
+              </a:ext>
+            </a:extLst>
+          </p:cNvPr>
+          <p:cNvGraphicFramePr>
+            <a:graphicFrameLocks noGrp="1"/>
+          </p:cNvGraphicFramePr>
+          <p:nvPr>
+            <p:ph idx="1"/>
+            <p:extLst>
+              <p:ext uri="{D42A27DB-BD31-4B8C-83A1-F6EECF244321}">
+                <p14:modId xmlns:p14="http://schemas.microsoft.com/office/powerpoint/2010/main" val="3893117731"/>
+              </p:ext>
+            </p:extLst>
+          </p:nvPr>
+        </p:nvGraphicFramePr>
+        <p:xfrm>
+          <a:off x="838200" y="4539094"/>
+          <a:ext cx="10515600" cy="2225040"/>
+        </p:xfrm>
+        <a:graphic>
+          <a:graphicData uri="http://schemas.openxmlformats.org/drawingml/2006/table">
+            <a:tbl>
+              <a:tblPr firstRow="1" bandRow="1">
+                <a:tableStyleId>{073A0DAA-6AF3-43AB-8588-CEC1D06C72B9}</a:tableStyleId>
+              </a:tblPr>
+              <a:tblGrid>
+                <a:gridCol w="2103120">
+                  <a:extLst>
+                    <a:ext uri="{9D8B030D-6E8A-4147-A177-3AD203B41FA5}">
+                      <a16:colId xmlns:a16="http://schemas.microsoft.com/office/drawing/2014/main" val="2900726404"/>
+                    </a:ext>
+                  </a:extLst>
+                </a:gridCol>
+                <a:gridCol w="2103120">
+                  <a:extLst>
+                    <a:ext uri="{9D8B030D-6E8A-4147-A177-3AD203B41FA5}">
+                      <a16:colId xmlns:a16="http://schemas.microsoft.com/office/drawing/2014/main" val="2297780930"/>
+                    </a:ext>
+                  </a:extLst>
+                </a:gridCol>
+                <a:gridCol w="2103120">
+                  <a:extLst>
+                    <a:ext uri="{9D8B030D-6E8A-4147-A177-3AD203B41FA5}">
+                      <a16:colId xmlns:a16="http://schemas.microsoft.com/office/drawing/2014/main" val="1352057416"/>
+                    </a:ext>
+                  </a:extLst>
+                </a:gridCol>
+                <a:gridCol w="2103120">
+                  <a:extLst>
+                    <a:ext uri="{9D8B030D-6E8A-4147-A177-3AD203B41FA5}">
+                      <a16:colId xmlns:a16="http://schemas.microsoft.com/office/drawing/2014/main" val="1457082074"/>
+                    </a:ext>
+                  </a:extLst>
+                </a:gridCol>
+                <a:gridCol w="2103120">
+                  <a:extLst>
+                    <a:ext uri="{9D8B030D-6E8A-4147-A177-3AD203B41FA5}">
+                      <a16:colId xmlns:a16="http://schemas.microsoft.com/office/drawing/2014/main" val="633438695"/>
+                    </a:ext>
+                  </a:extLst>
+                </a:gridCol>
+              </a:tblGrid>
+              <a:tr h="370840">
+                <a:tc>
+                  <a:txBody>
+                    <a:bodyPr/>
+                    <a:lstStyle/>
+                    <a:p>
+                      <a:r>
+                        <a:rPr lang="en-US" dirty="0"/>
+                        <a:t>Model</a:t>
+                      </a:r>
+                    </a:p>
+                  </a:txBody>
+                  <a:tcPr/>
+                </a:tc>
+                <a:tc>
+                  <a:txBody>
+                    <a:bodyPr/>
+                    <a:lstStyle/>
+                    <a:p>
+                      <a:r>
+                        <a:rPr lang="en-US" dirty="0"/>
+                        <a:t>Exponential growth</a:t>
+                      </a:r>
+                    </a:p>
+                  </a:txBody>
+                  <a:tcPr/>
+                </a:tc>
+                <a:tc>
+                  <a:txBody>
+                    <a:bodyPr/>
+                    <a:lstStyle/>
+                    <a:p>
+                      <a:r>
+                        <a:rPr lang="en-US" dirty="0"/>
+                        <a:t>Two-epoch</a:t>
+                      </a:r>
+                    </a:p>
+                  </a:txBody>
+                  <a:tcPr/>
+                </a:tc>
+                <a:tc>
+                  <a:txBody>
+                    <a:bodyPr/>
+                    <a:lstStyle/>
+                    <a:p>
+                      <a:r>
+                        <a:rPr lang="en-US" dirty="0"/>
+                        <a:t>Bottleneck + growth</a:t>
+                      </a:r>
+                    </a:p>
+                  </a:txBody>
+                  <a:tcPr/>
+                </a:tc>
+                <a:tc>
+                  <a:txBody>
+                    <a:bodyPr/>
+                    <a:lstStyle/>
+                    <a:p>
+                      <a:r>
+                        <a:rPr lang="en-US" dirty="0"/>
+                        <a:t>Three-epoch</a:t>
+                      </a:r>
+                    </a:p>
+                  </a:txBody>
+                  <a:tcPr/>
+                </a:tc>
+                <a:extLst>
+                  <a:ext uri="{0D108BD9-81ED-4DB2-BD59-A6C34878D82A}">
+                    <a16:rowId xmlns:a16="http://schemas.microsoft.com/office/drawing/2014/main" val="3143057051"/>
+                  </a:ext>
+                </a:extLst>
+              </a:tr>
+              <a:tr h="370840">
+                <a:tc>
+                  <a:txBody>
+                    <a:bodyPr/>
+                    <a:lstStyle/>
+                    <a:p>
+                      <a:r>
+                        <a:rPr lang="en-US" dirty="0"/>
+                        <a:t>Log Likelihood</a:t>
+                      </a:r>
+                    </a:p>
+                  </a:txBody>
+                  <a:tcPr/>
+                </a:tc>
+                <a:tc>
+                  <a:txBody>
+                    <a:bodyPr/>
+                    <a:lstStyle/>
+                    <a:p>
+                      <a:r>
+                        <a:rPr lang="en-US" dirty="0"/>
+                        <a:t>-360.132009673</a:t>
+                      </a:r>
+                    </a:p>
+                  </a:txBody>
+                  <a:tcPr/>
+                </a:tc>
+                <a:tc>
+                  <a:txBody>
+                    <a:bodyPr/>
+                    <a:lstStyle/>
+                    <a:p>
+                      <a:r>
+                        <a:rPr lang="en-US" dirty="0">
+                          <a:highlight>
+                            <a:srgbClr val="FFFF00"/>
+                          </a:highlight>
+                        </a:rPr>
+                        <a:t>-188.144695197</a:t>
+                      </a:r>
+                    </a:p>
+                  </a:txBody>
+                  <a:tcPr/>
+                </a:tc>
+                <a:tc>
+                  <a:txBody>
+                    <a:bodyPr/>
+                    <a:lstStyle/>
+                    <a:p>
+                      <a:r>
+                        <a:rPr lang="en-US" dirty="0"/>
+                        <a:t>-189.599130013</a:t>
+                      </a:r>
+                      <a:endParaRPr lang="en-US" dirty="0">
+                        <a:highlight>
+                          <a:srgbClr val="FFFF00"/>
+                        </a:highlight>
+                      </a:endParaRPr>
+                    </a:p>
+                  </a:txBody>
+                  <a:tcPr/>
+                </a:tc>
+                <a:tc>
+                  <a:txBody>
+                    <a:bodyPr/>
+                    <a:lstStyle/>
+                    <a:p>
+                      <a:r>
+                        <a:rPr lang="en-US" dirty="0"/>
+                        <a:t>-200.178555584</a:t>
+                      </a:r>
+                    </a:p>
+                  </a:txBody>
+                  <a:tcPr/>
+                </a:tc>
+                <a:extLst>
+                  <a:ext uri="{0D108BD9-81ED-4DB2-BD59-A6C34878D82A}">
+                    <a16:rowId xmlns:a16="http://schemas.microsoft.com/office/drawing/2014/main" val="3235037204"/>
+                  </a:ext>
+                </a:extLst>
+              </a:tr>
+              <a:tr h="370840">
+                <a:tc>
+                  <a:txBody>
+                    <a:bodyPr/>
+                    <a:lstStyle/>
+                    <a:p>
+                      <a:r>
+                        <a:rPr lang="en-US" dirty="0" err="1"/>
+                        <a:t>Nu_a</a:t>
+                      </a:r>
+                      <a:endParaRPr lang="en-US" dirty="0"/>
+                    </a:p>
+                  </a:txBody>
+                  <a:tcPr/>
+                </a:tc>
+                <a:tc>
+                  <a:txBody>
+                    <a:bodyPr/>
+                    <a:lstStyle/>
+                    <a:p>
+                      <a:r>
+                        <a:rPr lang="en-US" dirty="0"/>
+                        <a:t>1.61936896</a:t>
+                      </a:r>
+                    </a:p>
+                  </a:txBody>
+                  <a:tcPr/>
+                </a:tc>
+                <a:tc>
+                  <a:txBody>
+                    <a:bodyPr/>
+                    <a:lstStyle/>
+                    <a:p>
+                      <a:r>
+                        <a:rPr lang="en-US" dirty="0"/>
+                        <a:t>1.86276421</a:t>
+                      </a:r>
+                    </a:p>
+                  </a:txBody>
+                  <a:tcPr/>
+                </a:tc>
+                <a:tc>
+                  <a:txBody>
+                    <a:bodyPr/>
+                    <a:lstStyle/>
+                    <a:p>
+                      <a:r>
+                        <a:rPr lang="en-US" dirty="0"/>
+                        <a:t>2.0649441</a:t>
+                      </a:r>
+                    </a:p>
+                  </a:txBody>
+                  <a:tcPr/>
+                </a:tc>
+                <a:tc>
+                  <a:txBody>
+                    <a:bodyPr/>
+                    <a:lstStyle/>
+                    <a:p>
+                      <a:r>
+                        <a:rPr lang="en-US" dirty="0"/>
+                        <a:t>0.15087902</a:t>
+                      </a:r>
+                    </a:p>
+                  </a:txBody>
+                  <a:tcPr/>
+                </a:tc>
+                <a:extLst>
+                  <a:ext uri="{0D108BD9-81ED-4DB2-BD59-A6C34878D82A}">
+                    <a16:rowId xmlns:a16="http://schemas.microsoft.com/office/drawing/2014/main" val="2717148640"/>
+                  </a:ext>
+                </a:extLst>
+              </a:tr>
+              <a:tr h="370840">
+                <a:tc>
+                  <a:txBody>
+                    <a:bodyPr/>
+                    <a:lstStyle/>
+                    <a:p>
+                      <a:r>
+                        <a:rPr lang="en-US" dirty="0" err="1"/>
+                        <a:t>Nu_b</a:t>
+                      </a:r>
+                      <a:endParaRPr lang="en-US" dirty="0"/>
+                    </a:p>
+                  </a:txBody>
+                  <a:tcPr/>
+                </a:tc>
+                <a:tc>
+                  <a:txBody>
+                    <a:bodyPr/>
+                    <a:lstStyle/>
+                    <a:p>
+                      <a:r>
+                        <a:rPr lang="en-US" dirty="0"/>
+                        <a:t>N/A</a:t>
+                      </a:r>
+                    </a:p>
+                  </a:txBody>
+                  <a:tcPr/>
+                </a:tc>
+                <a:tc>
+                  <a:txBody>
+                    <a:bodyPr/>
+                    <a:lstStyle/>
+                    <a:p>
+                      <a:r>
+                        <a:rPr lang="en-US" dirty="0"/>
+                        <a:t>N/A</a:t>
+                      </a:r>
+                    </a:p>
+                  </a:txBody>
+                  <a:tcPr/>
+                </a:tc>
+                <a:tc>
+                  <a:txBody>
+                    <a:bodyPr/>
+                    <a:lstStyle/>
+                    <a:p>
+                      <a:r>
+                        <a:rPr lang="en-US" dirty="0"/>
+                        <a:t>1.7472377</a:t>
+                      </a:r>
+                    </a:p>
+                  </a:txBody>
+                  <a:tcPr/>
+                </a:tc>
+                <a:tc>
+                  <a:txBody>
+                    <a:bodyPr/>
+                    <a:lstStyle/>
+                    <a:p>
+                      <a:r>
+                        <a:rPr lang="en-US" dirty="0"/>
+                        <a:t>0.60463415</a:t>
+                      </a:r>
+                    </a:p>
+                  </a:txBody>
+                  <a:tcPr/>
+                </a:tc>
+                <a:extLst>
+                  <a:ext uri="{0D108BD9-81ED-4DB2-BD59-A6C34878D82A}">
+                    <a16:rowId xmlns:a16="http://schemas.microsoft.com/office/drawing/2014/main" val="3992781458"/>
+                  </a:ext>
+                </a:extLst>
+              </a:tr>
+              <a:tr h="370840">
+                <a:tc>
+                  <a:txBody>
+                    <a:bodyPr/>
+                    <a:lstStyle/>
+                    <a:p>
+                      <a:r>
+                        <a:rPr lang="en-US" dirty="0"/>
+                        <a:t>T_12</a:t>
+                      </a:r>
+                    </a:p>
+                  </a:txBody>
+                  <a:tcPr/>
+                </a:tc>
+                <a:tc>
+                  <a:txBody>
+                    <a:bodyPr/>
+                    <a:lstStyle/>
+                    <a:p>
+                      <a:r>
+                        <a:rPr lang="en-US" dirty="0"/>
+                        <a:t>0.21071071</a:t>
+                      </a:r>
+                    </a:p>
+                  </a:txBody>
+                  <a:tcPr/>
+                </a:tc>
+                <a:tc>
+                  <a:txBody>
+                    <a:bodyPr/>
+                    <a:lstStyle/>
+                    <a:p>
+                      <a:r>
+                        <a:rPr lang="en-US" dirty="0"/>
+                        <a:t>0.98340861</a:t>
+                      </a:r>
+                    </a:p>
+                  </a:txBody>
+                  <a:tcPr/>
+                </a:tc>
+                <a:tc>
+                  <a:txBody>
+                    <a:bodyPr/>
+                    <a:lstStyle/>
+                    <a:p>
+                      <a:r>
+                        <a:rPr lang="en-US" dirty="0"/>
+                        <a:t>0.77825979</a:t>
+                      </a:r>
+                    </a:p>
+                  </a:txBody>
+                  <a:tcPr/>
+                </a:tc>
+                <a:tc>
+                  <a:txBody>
+                    <a:bodyPr/>
+                    <a:lstStyle/>
+                    <a:p>
+                      <a:r>
+                        <a:rPr lang="en-US" dirty="0"/>
+                        <a:t>0.23744711</a:t>
+                      </a:r>
+                    </a:p>
+                  </a:txBody>
+                  <a:tcPr/>
+                </a:tc>
+                <a:extLst>
+                  <a:ext uri="{0D108BD9-81ED-4DB2-BD59-A6C34878D82A}">
+                    <a16:rowId xmlns:a16="http://schemas.microsoft.com/office/drawing/2014/main" val="3283572519"/>
+                  </a:ext>
+                </a:extLst>
+              </a:tr>
+              <a:tr h="370840">
+                <a:tc>
+                  <a:txBody>
+                    <a:bodyPr/>
+                    <a:lstStyle/>
+                    <a:p>
+                      <a:r>
+                        <a:rPr lang="en-US" dirty="0"/>
+                        <a:t>T_23</a:t>
+                      </a:r>
+                    </a:p>
+                  </a:txBody>
+                  <a:tcPr/>
+                </a:tc>
+                <a:tc>
+                  <a:txBody>
+                    <a:bodyPr/>
+                    <a:lstStyle/>
+                    <a:p>
+                      <a:r>
+                        <a:rPr lang="en-US" dirty="0"/>
+                        <a:t>N/A</a:t>
+                      </a:r>
+                    </a:p>
+                  </a:txBody>
+                  <a:tcPr/>
+                </a:tc>
+                <a:tc>
+                  <a:txBody>
+                    <a:bodyPr/>
+                    <a:lstStyle/>
+                    <a:p>
+                      <a:r>
+                        <a:rPr lang="en-US" dirty="0"/>
+                        <a:t>N/A</a:t>
+                      </a:r>
+                    </a:p>
+                  </a:txBody>
+                  <a:tcPr/>
+                </a:tc>
+                <a:tc>
+                  <a:txBody>
+                    <a:bodyPr/>
+                    <a:lstStyle/>
+                    <a:p>
+                      <a:r>
+                        <a:rPr lang="en-US" dirty="0"/>
+                        <a:t>N/A</a:t>
+                      </a:r>
+                    </a:p>
+                  </a:txBody>
+                  <a:tcPr/>
+                </a:tc>
+                <a:tc>
+                  <a:txBody>
+                    <a:bodyPr/>
+                    <a:lstStyle/>
+                    <a:p>
+                      <a:r>
+                        <a:rPr lang="en-US" dirty="0"/>
+                        <a:t>0.27554825</a:t>
+                      </a:r>
+                    </a:p>
+                  </a:txBody>
+                  <a:tcPr/>
+                </a:tc>
+                <a:extLst>
+                  <a:ext uri="{0D108BD9-81ED-4DB2-BD59-A6C34878D82A}">
+                    <a16:rowId xmlns:a16="http://schemas.microsoft.com/office/drawing/2014/main" val="2422470866"/>
+                  </a:ext>
+                </a:extLst>
+              </a:tr>
+            </a:tbl>
+          </a:graphicData>
+        </a:graphic>
+      </p:graphicFrame>
+    </p:spTree>
+    <p:extLst>
+      <p:ext uri="{BB962C8B-B14F-4D97-AF65-F5344CB8AC3E}">
+        <p14:creationId xmlns:p14="http://schemas.microsoft.com/office/powerpoint/2010/main" val="3087052385"/>
+      </p:ext>
+    </p:extLst>
+  </p:cSld>
+  <p:clrMapOvr>
+    <a:masterClrMapping/>
+  </p:clrMapOvr>
+</p:sld>
+</file>
+
+<file path=ppt/slides/slide12.xml><?xml version="1.0" encoding="utf-8"?>
+<p:sld xmlns:a="http://schemas.openxmlformats.org/drawingml/2006/main" xmlns:r="http://schemas.openxmlformats.org/officeDocument/2006/relationships" xmlns:p="http://schemas.openxmlformats.org/presentationml/2006/main">
+  <p:cSld>
+    <p:spTree>
+      <p:nvGrpSpPr>
+        <p:cNvPr id="1" name=""/>
+        <p:cNvGrpSpPr/>
+        <p:nvPr/>
+      </p:nvGrpSpPr>
+      <p:grpSpPr>
+        <a:xfrm>
+          <a:off x="0" y="0"/>
+          <a:ext cx="0" cy="0"/>
+          <a:chOff x="0" y="0"/>
+          <a:chExt cx="0" cy="0"/>
+        </a:xfrm>
+      </p:grpSpPr>
+      <p:sp>
+        <p:nvSpPr>
+          <p:cNvPr id="2" name="Title 1">
+            <a:extLst>
+              <a:ext uri="{FF2B5EF4-FFF2-40B4-BE49-F238E27FC236}">
                 <a16:creationId xmlns:a16="http://schemas.microsoft.com/office/drawing/2014/main" id="{1DA4FD9C-0575-4672-BDCF-805449EFAC7C}"/>
               </a:ext>
             </a:extLst>
@@ -4180,77 +5586,6 @@
                 <a:sym typeface="Wingdings" panose="05000000000000000000" pitchFamily="2" charset="2"/>
               </a:rPr>
               <a:t>E.g., parse input and output so that it can quickly plot different a different species.</a:t>
-            </a:r>
-          </a:p>
-          <a:p>
-            <a:r>
-              <a:rPr lang="en-US" dirty="0">
-                <a:sym typeface="Wingdings" panose="05000000000000000000" pitchFamily="2" charset="2"/>
-              </a:rPr>
-              <a:t>Find reasonable initial guesses for demographic params</a:t>
-            </a:r>
-          </a:p>
-          <a:p>
-            <a:r>
-              <a:rPr lang="en-US">
-                <a:sym typeface="Wingdings" panose="05000000000000000000" pitchFamily="2" charset="2"/>
-              </a:rPr>
-              <a:t>Read scripts without debug mode</a:t>
-            </a:r>
-            <a:endParaRPr lang="en-US" dirty="0">
-              <a:sym typeface="Wingdings" panose="05000000000000000000" pitchFamily="2" charset="2"/>
-            </a:endParaRPr>
-          </a:p>
-          <a:p>
-            <a:r>
-              <a:rPr lang="en-US" dirty="0">
-                <a:sym typeface="Wingdings" panose="05000000000000000000" pitchFamily="2" charset="2"/>
-              </a:rPr>
-              <a:t>Read about microbial demographics: H. pylori (</a:t>
-            </a:r>
-            <a:r>
-              <a:rPr lang="en-US" dirty="0" err="1">
-                <a:sym typeface="Wingdings" panose="05000000000000000000" pitchFamily="2" charset="2"/>
-              </a:rPr>
-              <a:t>Falush</a:t>
-            </a:r>
-            <a:r>
-              <a:rPr lang="en-US" dirty="0">
-                <a:sym typeface="Wingdings" panose="05000000000000000000" pitchFamily="2" charset="2"/>
-              </a:rPr>
-              <a:t>), P. </a:t>
-            </a:r>
-            <a:r>
-              <a:rPr lang="en-US" dirty="0" err="1">
-                <a:sym typeface="Wingdings" panose="05000000000000000000" pitchFamily="2" charset="2"/>
-              </a:rPr>
-              <a:t>copri</a:t>
-            </a:r>
-            <a:r>
-              <a:rPr lang="en-US" dirty="0">
-                <a:sym typeface="Wingdings" panose="05000000000000000000" pitchFamily="2" charset="2"/>
-              </a:rPr>
-              <a:t> (</a:t>
-            </a:r>
-            <a:r>
-              <a:rPr lang="en-US" dirty="0" err="1">
-                <a:sym typeface="Wingdings" panose="05000000000000000000" pitchFamily="2" charset="2"/>
-              </a:rPr>
-              <a:t>Tett</a:t>
-            </a:r>
-            <a:r>
-              <a:rPr lang="en-US" dirty="0">
-                <a:sym typeface="Wingdings" panose="05000000000000000000" pitchFamily="2" charset="2"/>
-              </a:rPr>
-              <a:t>), truong2017microbial</a:t>
-            </a:r>
-          </a:p>
-          <a:p>
-            <a:r>
-              <a:rPr lang="en-US" dirty="0">
-                <a:sym typeface="Wingdings" panose="05000000000000000000" pitchFamily="2" charset="2"/>
-              </a:rPr>
-              <a:t>Read Midas paper (nayfach2016integrated)</a:t>
             </a:r>
           </a:p>
           <a:p>
@@ -4276,7 +5611,7 @@
 </p:sld>
 </file>
 
-<file path=ppt/slides/slide11.xml><?xml version="1.0" encoding="utf-8"?>
+<file path=ppt/slides/slide13.xml><?xml version="1.0" encoding="utf-8"?>
 <p:sld xmlns:a="http://schemas.openxmlformats.org/drawingml/2006/main" xmlns:r="http://schemas.openxmlformats.org/officeDocument/2006/relationships" xmlns:p="http://schemas.openxmlformats.org/presentationml/2006/main">
   <p:cSld>
     <p:spTree>
@@ -4478,13 +5813,8 @@
           <a:p>
             <a:r>
               <a:rPr lang="en-US" dirty="0"/>
-              <a:t>Congrats on pulling the Uno reverse card RE: soft </a:t>
-            </a:r>
-            <a:r>
-              <a:rPr lang="en-US"/>
-              <a:t>selective sweeps</a:t>
-            </a:r>
-            <a:endParaRPr lang="en-US" dirty="0"/>
+              <a:t>Congrats on pulling the Uno reverse card RE: soft selective sweeps</a:t>
+            </a:r>
           </a:p>
         </p:txBody>
       </p:sp>
@@ -4929,137 +6259,148 @@
         </p:nvSpPr>
         <p:spPr/>
         <p:txBody>
-          <a:bodyPr/>
+          <a:bodyPr>
+            <a:normAutofit lnSpcReduction="10000"/>
+          </a:bodyPr>
           <a:lstStyle/>
           <a:p>
             <a:r>
-              <a:rPr lang="en-US" dirty="0"/>
-              <a:t>Read through `</a:t>
-            </a:r>
-            <a:r>
-              <a:rPr lang="en-US" dirty="0" err="1"/>
-              <a:t>microbiome_evolution</a:t>
-            </a:r>
-            <a:r>
-              <a:rPr lang="en-US" dirty="0"/>
-              <a:t>` codebase</a:t>
+              <a:rPr lang="en-US" dirty="0">
+                <a:sym typeface="Wingdings" panose="05000000000000000000" pitchFamily="2" charset="2"/>
+              </a:rPr>
+              <a:t>Read about microbial demographics: H. pylori (</a:t>
+            </a:r>
+            <a:r>
+              <a:rPr lang="en-US" dirty="0" err="1">
+                <a:sym typeface="Wingdings" panose="05000000000000000000" pitchFamily="2" charset="2"/>
+              </a:rPr>
+              <a:t>Falush</a:t>
+            </a:r>
+            <a:r>
+              <a:rPr lang="en-US" dirty="0">
+                <a:sym typeface="Wingdings" panose="05000000000000000000" pitchFamily="2" charset="2"/>
+              </a:rPr>
+              <a:t>), P. </a:t>
+            </a:r>
+            <a:r>
+              <a:rPr lang="en-US" dirty="0" err="1">
+                <a:sym typeface="Wingdings" panose="05000000000000000000" pitchFamily="2" charset="2"/>
+              </a:rPr>
+              <a:t>copri</a:t>
+            </a:r>
+            <a:r>
+              <a:rPr lang="en-US" dirty="0">
+                <a:sym typeface="Wingdings" panose="05000000000000000000" pitchFamily="2" charset="2"/>
+              </a:rPr>
+              <a:t> (</a:t>
+            </a:r>
+            <a:r>
+              <a:rPr lang="en-US" dirty="0" err="1">
+                <a:sym typeface="Wingdings" panose="05000000000000000000" pitchFamily="2" charset="2"/>
+              </a:rPr>
+              <a:t>Tett</a:t>
+            </a:r>
+            <a:r>
+              <a:rPr lang="en-US" dirty="0">
+                <a:sym typeface="Wingdings" panose="05000000000000000000" pitchFamily="2" charset="2"/>
+              </a:rPr>
+              <a:t>), truong2017microbial</a:t>
+            </a:r>
+          </a:p>
+          <a:p>
+            <a:r>
+              <a:rPr lang="en-US" dirty="0">
+                <a:sym typeface="Wingdings" panose="05000000000000000000" pitchFamily="2" charset="2"/>
+              </a:rPr>
+              <a:t>Read Midas paper (nayfach2016integrated)</a:t>
+            </a:r>
+          </a:p>
+          <a:p>
+            <a:r>
+              <a:rPr lang="en-US" dirty="0">
+                <a:sym typeface="Wingdings" panose="05000000000000000000" pitchFamily="2" charset="2"/>
+              </a:rPr>
+              <a:t>Preliminary </a:t>
+            </a:r>
+            <a:r>
+              <a:rPr lang="en-US" dirty="0" err="1">
+                <a:sym typeface="Wingdings" panose="05000000000000000000" pitchFamily="2" charset="2"/>
+              </a:rPr>
+              <a:t>Dadi</a:t>
+            </a:r>
+            <a:r>
+              <a:rPr lang="en-US" dirty="0">
+                <a:sym typeface="Wingdings" panose="05000000000000000000" pitchFamily="2" charset="2"/>
+              </a:rPr>
+              <a:t> analysis for top five common species</a:t>
             </a:r>
           </a:p>
           <a:p>
             <a:pPr lvl="1"/>
             <a:r>
-              <a:rPr lang="en-US" dirty="0"/>
-              <a:t>I have a rough idea of how things work together, file format, etc.</a:t>
-            </a:r>
-          </a:p>
-          <a:p>
-            <a:r>
-              <a:rPr lang="en-US" dirty="0"/>
-              <a:t>Recreate figure output from `</a:t>
-            </a:r>
-            <a:r>
-              <a:rPr lang="en-US" dirty="0" err="1"/>
-              <a:t>plot_within_clade_sfs</a:t>
-            </a:r>
-            <a:r>
-              <a:rPr lang="en-US" dirty="0"/>
-              <a:t>`</a:t>
-            </a:r>
-          </a:p>
-          <a:p>
-            <a:r>
-              <a:rPr lang="en-US" dirty="0"/>
-              <a:t>Output </a:t>
-            </a:r>
-            <a:r>
-              <a:rPr lang="en-US" dirty="0" err="1"/>
+              <a:rPr lang="en-US" dirty="0">
+                <a:sym typeface="Wingdings" panose="05000000000000000000" pitchFamily="2" charset="2"/>
+              </a:rPr>
+              <a:t>I’ve had some trouble with finding reasonable initial guesses and parameter bounds for the inference.</a:t>
+            </a:r>
+          </a:p>
+          <a:p>
+            <a:pPr lvl="1"/>
+            <a:r>
+              <a:rPr lang="en-US" dirty="0">
+                <a:sym typeface="Wingdings" panose="05000000000000000000" pitchFamily="2" charset="2"/>
+              </a:rPr>
+              <a:t>A lot of the assumptions I make are based on inference over different data sets, i.e., dogs and simulated data. I think some of these assumptions don’t apply as well for bacteria</a:t>
+            </a:r>
+          </a:p>
+          <a:p>
+            <a:pPr lvl="1"/>
+            <a:r>
+              <a:rPr lang="en-US" dirty="0">
+                <a:sym typeface="Wingdings" panose="05000000000000000000" pitchFamily="2" charset="2"/>
+              </a:rPr>
+              <a:t>The microbial demographic papers were very helpful reads in this regard.</a:t>
+            </a:r>
+          </a:p>
+          <a:p>
+            <a:r>
+              <a:rPr lang="en-US" dirty="0">
+                <a:sym typeface="Wingdings" panose="05000000000000000000" pitchFamily="2" charset="2"/>
+              </a:rPr>
+              <a:t>I computed the expected </a:t>
+            </a:r>
+            <a:r>
+              <a:rPr lang="en-US" dirty="0" err="1">
+                <a:sym typeface="Wingdings" panose="05000000000000000000" pitchFamily="2" charset="2"/>
+              </a:rPr>
               <a:t>sfs</a:t>
             </a:r>
             <a:r>
-              <a:rPr lang="en-US" dirty="0"/>
-              <a:t> in file format</a:t>
-            </a:r>
-          </a:p>
-          <a:p>
-            <a:pPr lvl="1"/>
-            <a:r>
-              <a:rPr lang="en-US" dirty="0"/>
-              <a:t>The count locations are:</a:t>
-            </a:r>
-          </a:p>
-          <a:p>
-            <a:pPr marL="457200" lvl="1" indent="0">
-              <a:buNone/>
-            </a:pPr>
-            <a:r>
-              <a:rPr lang="en-US" dirty="0"/>
-              <a:t>1 2 3 4…</a:t>
-            </a:r>
-          </a:p>
-          <a:p>
-            <a:pPr lvl="1"/>
-            <a:r>
-              <a:rPr lang="en-US" dirty="0"/>
-              <a:t>The synonymous SFS is:</a:t>
-            </a:r>
-          </a:p>
-          <a:p>
-            <a:pPr marL="457200" lvl="1" indent="0">
-              <a:buNone/>
-            </a:pPr>
-            <a:r>
-              <a:rPr lang="en-US" dirty="0"/>
-              <a:t>3066 1346 904 727…</a:t>
-            </a:r>
-          </a:p>
-          <a:p>
-            <a:pPr lvl="1"/>
-            <a:r>
-              <a:rPr lang="en-US" dirty="0"/>
-              <a:t>The nonsynonymous SFS is:</a:t>
-            </a:r>
-          </a:p>
-          <a:p>
-            <a:pPr marL="457200" lvl="1" indent="0">
-              <a:buNone/>
-            </a:pPr>
-            <a:r>
-              <a:rPr lang="en-US" dirty="0"/>
-              <a:t>3254 1171 732 513…</a:t>
-            </a:r>
-          </a:p>
-        </p:txBody>
-      </p:sp>
-      <p:pic>
-        <p:nvPicPr>
-          <p:cNvPr id="7" name="Picture 6">
-            <a:extLst>
-              <a:ext uri="{FF2B5EF4-FFF2-40B4-BE49-F238E27FC236}">
-                <a16:creationId xmlns:a16="http://schemas.microsoft.com/office/drawing/2014/main" id="{33B0F19C-6B96-4E47-BF31-0A79CD7D142F}"/>
-              </a:ext>
-            </a:extLst>
-          </p:cNvPr>
-          <p:cNvPicPr>
-            <a:picLocks noChangeAspect="1"/>
-          </p:cNvPicPr>
-          <p:nvPr/>
-        </p:nvPicPr>
-        <p:blipFill>
-          <a:blip r:embed="rId2"/>
-          <a:stretch>
-            <a:fillRect/>
-          </a:stretch>
-        </p:blipFill>
-        <p:spPr>
-          <a:xfrm>
-            <a:off x="5058608" y="3329717"/>
-            <a:ext cx="7133392" cy="2922192"/>
-          </a:xfrm>
-          <a:prstGeom prst="rect">
-            <a:avLst/>
-          </a:prstGeom>
-        </p:spPr>
-      </p:pic>
+              <a:rPr lang="en-US" dirty="0">
+                <a:sym typeface="Wingdings" panose="05000000000000000000" pitchFamily="2" charset="2"/>
+              </a:rPr>
+              <a:t> using </a:t>
+            </a:r>
+            <a:r>
+              <a:rPr lang="en-US" dirty="0" err="1">
+                <a:sym typeface="Wingdings" panose="05000000000000000000" pitchFamily="2" charset="2"/>
+              </a:rPr>
+              <a:t>Dadi</a:t>
+            </a:r>
+            <a:r>
+              <a:rPr lang="en-US" dirty="0">
+                <a:sym typeface="Wingdings" panose="05000000000000000000" pitchFamily="2" charset="2"/>
+              </a:rPr>
+              <a:t>. Will have plots for tomorrow.</a:t>
+            </a:r>
+          </a:p>
+          <a:p>
+            <a:endParaRPr lang="en-US" dirty="0">
+              <a:sym typeface="Wingdings" panose="05000000000000000000" pitchFamily="2" charset="2"/>
+            </a:endParaRPr>
+          </a:p>
+        </p:txBody>
+      </p:sp>
     </p:spTree>
     <p:extLst>
       <p:ext uri="{BB962C8B-B14F-4D97-AF65-F5344CB8AC3E}">
@@ -5095,7 +6436,7 @@
           <p:cNvPr id="2" name="Title 1">
             <a:extLst>
               <a:ext uri="{FF2B5EF4-FFF2-40B4-BE49-F238E27FC236}">
-                <a16:creationId xmlns:a16="http://schemas.microsoft.com/office/drawing/2014/main" id="{9C91C0AA-C083-4488-8B2B-78453C8EDC36}"/>
+                <a16:creationId xmlns:a16="http://schemas.microsoft.com/office/drawing/2014/main" id="{65D628C1-80CE-412C-8D99-87265F8BBF5F}"/>
               </a:ext>
             </a:extLst>
           </p:cNvPr>
@@ -5113,50 +6454,199 @@
           <a:p>
             <a:r>
               <a:rPr lang="en-US" dirty="0"/>
-              <a:t>SFS for B. </a:t>
+              <a:t>Implementation details (for following slides)</a:t>
+            </a:r>
+          </a:p>
+        </p:txBody>
+      </p:sp>
+      <p:sp>
+        <p:nvSpPr>
+          <p:cNvPr id="3" name="Content Placeholder 2">
+            <a:extLst>
+              <a:ext uri="{FF2B5EF4-FFF2-40B4-BE49-F238E27FC236}">
+                <a16:creationId xmlns:a16="http://schemas.microsoft.com/office/drawing/2014/main" id="{E5DEB96E-5753-4F3F-BEAE-0BD8F8946CEB}"/>
+              </a:ext>
+            </a:extLst>
+          </p:cNvPr>
+          <p:cNvSpPr>
+            <a:spLocks noGrp="1"/>
+          </p:cNvSpPr>
+          <p:nvPr>
+            <p:ph idx="1"/>
+          </p:nvPr>
+        </p:nvSpPr>
+        <p:spPr/>
+        <p:txBody>
+          <a:bodyPr>
+            <a:normAutofit fontScale="92500" lnSpcReduction="10000"/>
+          </a:bodyPr>
+          <a:lstStyle/>
+          <a:p>
+            <a:r>
+              <a:rPr lang="en-US" dirty="0"/>
+              <a:t>Input synonymous SFS’s: output from `plot_within_clade_sfs.py`.</a:t>
+            </a:r>
+          </a:p>
+          <a:p>
+            <a:pPr lvl="1"/>
+            <a:r>
+              <a:rPr lang="en-US" dirty="0"/>
+              <a:t>B. </a:t>
             </a:r>
             <a:r>
               <a:rPr lang="en-US" dirty="0" err="1"/>
               <a:t>vulgatus</a:t>
             </a:r>
-            <a:endParaRPr lang="en-US" dirty="0"/>
-          </a:p>
-        </p:txBody>
-      </p:sp>
-      <p:pic>
-        <p:nvPicPr>
-          <p:cNvPr id="5" name="Picture 4">
-            <a:extLst>
-              <a:ext uri="{FF2B5EF4-FFF2-40B4-BE49-F238E27FC236}">
-                <a16:creationId xmlns:a16="http://schemas.microsoft.com/office/drawing/2014/main" id="{15F39A58-A90A-484D-B6E8-75B593A627C8}"/>
-              </a:ext>
-            </a:extLst>
-          </p:cNvPr>
-          <p:cNvPicPr>
-            <a:picLocks noChangeAspect="1"/>
-          </p:cNvPicPr>
-          <p:nvPr/>
-        </p:nvPicPr>
-        <p:blipFill>
-          <a:blip r:embed="rId2"/>
-          <a:stretch>
-            <a:fillRect/>
-          </a:stretch>
-        </p:blipFill>
-        <p:spPr>
-          <a:xfrm>
-            <a:off x="0" y="1576210"/>
-            <a:ext cx="12192000" cy="4916665"/>
-          </a:xfrm>
-          <a:prstGeom prst="rect">
-            <a:avLst/>
-          </a:prstGeom>
-        </p:spPr>
-      </p:pic>
+            <a:r>
+              <a:rPr lang="en-US" dirty="0"/>
+              <a:t>, B. </a:t>
+            </a:r>
+            <a:r>
+              <a:rPr lang="en-US" dirty="0" err="1"/>
+              <a:t>ovatus</a:t>
+            </a:r>
+            <a:r>
+              <a:rPr lang="en-US" dirty="0"/>
+              <a:t>, A. </a:t>
+            </a:r>
+            <a:r>
+              <a:rPr lang="en-US" dirty="0" err="1"/>
+              <a:t>putredinis</a:t>
+            </a:r>
+            <a:r>
+              <a:rPr lang="en-US" dirty="0"/>
+              <a:t>, B. </a:t>
+            </a:r>
+            <a:r>
+              <a:rPr lang="en-US" dirty="0" err="1"/>
+              <a:t>uniformis</a:t>
+            </a:r>
+            <a:r>
+              <a:rPr lang="en-US" dirty="0"/>
+              <a:t>, E. </a:t>
+            </a:r>
+            <a:r>
+              <a:rPr lang="en-US" dirty="0" err="1"/>
+              <a:t>rectale</a:t>
+            </a:r>
+            <a:r>
+              <a:rPr lang="en-US" dirty="0"/>
+              <a:t>.</a:t>
+            </a:r>
+          </a:p>
+          <a:p>
+            <a:r>
+              <a:rPr lang="en-US" dirty="0"/>
+              <a:t>Four demographic models </a:t>
+            </a:r>
+          </a:p>
+          <a:p>
+            <a:pPr lvl="1"/>
+            <a:r>
+              <a:rPr lang="en-US" dirty="0"/>
+              <a:t>exponential growth, two-epoch, bottleneck + growth, three-epoch</a:t>
+            </a:r>
+          </a:p>
+          <a:p>
+            <a:r>
+              <a:rPr lang="en-US" dirty="0"/>
+              <a:t>For each input species</a:t>
+            </a:r>
+          </a:p>
+          <a:p>
+            <a:pPr lvl="1"/>
+            <a:r>
+              <a:rPr lang="en-US" dirty="0"/>
+              <a:t>For each model:</a:t>
+            </a:r>
+          </a:p>
+          <a:p>
+            <a:pPr lvl="2"/>
+            <a:r>
+              <a:rPr lang="en-US" dirty="0"/>
+              <a:t>Take </a:t>
+            </a:r>
+            <a:r>
+              <a:rPr lang="en-US" dirty="0">
+                <a:solidFill>
+                  <a:srgbClr val="FF0000"/>
+                </a:solidFill>
+              </a:rPr>
+              <a:t>10</a:t>
+            </a:r>
+            <a:r>
+              <a:rPr lang="en-US" dirty="0"/>
+              <a:t> initial guesses for parameter space (parameters differ by model)</a:t>
+            </a:r>
+          </a:p>
+          <a:p>
+            <a:pPr lvl="3"/>
+            <a:r>
+              <a:rPr lang="en-US" dirty="0">
+                <a:solidFill>
+                  <a:srgbClr val="FF0000"/>
+                </a:solidFill>
+              </a:rPr>
+              <a:t>Still testing inference pipeline, so took 10 instead of 25, or some larger number</a:t>
+            </a:r>
+          </a:p>
+          <a:p>
+            <a:pPr lvl="2"/>
+            <a:r>
+              <a:rPr lang="en-US" dirty="0"/>
+              <a:t>For each initial guess:</a:t>
+            </a:r>
+          </a:p>
+          <a:p>
+            <a:pPr lvl="3"/>
+            <a:r>
+              <a:rPr lang="en-US" dirty="0"/>
+              <a:t>Iterate through gradient ascent to find maximum likelihood for &lt;= </a:t>
+            </a:r>
+            <a:r>
+              <a:rPr lang="en-US" dirty="0">
+                <a:solidFill>
+                  <a:srgbClr val="FF0000"/>
+                </a:solidFill>
+              </a:rPr>
+              <a:t>25</a:t>
+            </a:r>
+            <a:r>
+              <a:rPr lang="en-US" dirty="0"/>
+              <a:t> steps</a:t>
+            </a:r>
+          </a:p>
+          <a:p>
+            <a:pPr lvl="4"/>
+            <a:r>
+              <a:rPr lang="en-US" dirty="0">
+                <a:solidFill>
+                  <a:srgbClr val="FF0000"/>
+                </a:solidFill>
+              </a:rPr>
+              <a:t>Still testing inference pipeline, so took 25 steps instead of 100, or some larger number</a:t>
+            </a:r>
+          </a:p>
+          <a:p>
+            <a:pPr lvl="3"/>
+            <a:r>
+              <a:rPr lang="en-US" dirty="0"/>
+              <a:t>Compute model params and log likelihood</a:t>
+            </a:r>
+          </a:p>
+          <a:p>
+            <a:pPr lvl="2"/>
+            <a:r>
+              <a:rPr lang="en-US" dirty="0"/>
+              <a:t>Output log likelihood and model params of best initial guess + iterations</a:t>
+            </a:r>
+          </a:p>
+        </p:txBody>
+      </p:sp>
     </p:spTree>
     <p:extLst>
       <p:ext uri="{BB962C8B-B14F-4D97-AF65-F5344CB8AC3E}">
-        <p14:creationId xmlns:p14="http://schemas.microsoft.com/office/powerpoint/2010/main" val="1388977413"/>
+        <p14:creationId xmlns:p14="http://schemas.microsoft.com/office/powerpoint/2010/main" val="253882185"/>
       </p:ext>
     </p:extLst>
   </p:cSld>
@@ -5188,7 +6678,7 @@
           <p:cNvPr id="2" name="Title 1">
             <a:extLst>
               <a:ext uri="{FF2B5EF4-FFF2-40B4-BE49-F238E27FC236}">
-                <a16:creationId xmlns:a16="http://schemas.microsoft.com/office/drawing/2014/main" id="{9C91C0AA-C083-4488-8B2B-78453C8EDC36}"/>
+                <a16:creationId xmlns:a16="http://schemas.microsoft.com/office/drawing/2014/main" id="{FC0C9624-1DBB-4B7A-B446-0EC6DD7756EB}"/>
               </a:ext>
             </a:extLst>
           </p:cNvPr>
@@ -5206,11 +6696,11 @@
           <a:p>
             <a:r>
               <a:rPr lang="en-US" dirty="0"/>
-              <a:t>SFS for B. </a:t>
+              <a:t>Bacteroides </a:t>
             </a:r>
             <a:r>
               <a:rPr lang="en-US" dirty="0" err="1"/>
-              <a:t>uniformis</a:t>
+              <a:t>vulgatus</a:t>
             </a:r>
             <a:endParaRPr lang="en-US" dirty="0"/>
           </a:p>
@@ -5221,7 +6711,7 @@
           <p:cNvPr id="4" name="Picture 3">
             <a:extLst>
               <a:ext uri="{FF2B5EF4-FFF2-40B4-BE49-F238E27FC236}">
-                <a16:creationId xmlns:a16="http://schemas.microsoft.com/office/drawing/2014/main" id="{92423EDD-031B-4206-B17E-F0CFEE1D96CC}"/>
+                <a16:creationId xmlns:a16="http://schemas.microsoft.com/office/drawing/2014/main" id="{9DB340DB-FA02-4114-ABE9-205AE7B9DF6A}"/>
               </a:ext>
             </a:extLst>
           </p:cNvPr>
@@ -5238,18 +6728,666 @@
         </p:blipFill>
         <p:spPr>
           <a:xfrm>
-            <a:off x="0" y="1521380"/>
-            <a:ext cx="12192000" cy="4971495"/>
+            <a:off x="245805" y="1351179"/>
+            <a:ext cx="8186891" cy="3373375"/>
           </a:xfrm>
           <a:prstGeom prst="rect">
             <a:avLst/>
           </a:prstGeom>
         </p:spPr>
       </p:pic>
+      <p:graphicFrame>
+        <p:nvGraphicFramePr>
+          <p:cNvPr id="6" name="Table 4">
+            <a:extLst>
+              <a:ext uri="{FF2B5EF4-FFF2-40B4-BE49-F238E27FC236}">
+                <a16:creationId xmlns:a16="http://schemas.microsoft.com/office/drawing/2014/main" id="{43C8BB81-281C-4708-87FA-66B8AFDEA2BD}"/>
+              </a:ext>
+            </a:extLst>
+          </p:cNvPr>
+          <p:cNvGraphicFramePr>
+            <a:graphicFrameLocks noGrp="1"/>
+          </p:cNvGraphicFramePr>
+          <p:nvPr>
+            <p:ph idx="1"/>
+            <p:extLst>
+              <p:ext uri="{D42A27DB-BD31-4B8C-83A1-F6EECF244321}">
+                <p14:modId xmlns:p14="http://schemas.microsoft.com/office/powerpoint/2010/main" val="3038942447"/>
+              </p:ext>
+            </p:extLst>
+          </p:nvPr>
+        </p:nvGraphicFramePr>
+        <p:xfrm>
+          <a:off x="838200" y="4539094"/>
+          <a:ext cx="10515600" cy="2225040"/>
+        </p:xfrm>
+        <a:graphic>
+          <a:graphicData uri="http://schemas.openxmlformats.org/drawingml/2006/table">
+            <a:tbl>
+              <a:tblPr firstRow="1" bandRow="1">
+                <a:tableStyleId>{073A0DAA-6AF3-43AB-8588-CEC1D06C72B9}</a:tableStyleId>
+              </a:tblPr>
+              <a:tblGrid>
+                <a:gridCol w="2103120">
+                  <a:extLst>
+                    <a:ext uri="{9D8B030D-6E8A-4147-A177-3AD203B41FA5}">
+                      <a16:colId xmlns:a16="http://schemas.microsoft.com/office/drawing/2014/main" val="2900726404"/>
+                    </a:ext>
+                  </a:extLst>
+                </a:gridCol>
+                <a:gridCol w="2103120">
+                  <a:extLst>
+                    <a:ext uri="{9D8B030D-6E8A-4147-A177-3AD203B41FA5}">
+                      <a16:colId xmlns:a16="http://schemas.microsoft.com/office/drawing/2014/main" val="2297780930"/>
+                    </a:ext>
+                  </a:extLst>
+                </a:gridCol>
+                <a:gridCol w="2103120">
+                  <a:extLst>
+                    <a:ext uri="{9D8B030D-6E8A-4147-A177-3AD203B41FA5}">
+                      <a16:colId xmlns:a16="http://schemas.microsoft.com/office/drawing/2014/main" val="1352057416"/>
+                    </a:ext>
+                  </a:extLst>
+                </a:gridCol>
+                <a:gridCol w="2103120">
+                  <a:extLst>
+                    <a:ext uri="{9D8B030D-6E8A-4147-A177-3AD203B41FA5}">
+                      <a16:colId xmlns:a16="http://schemas.microsoft.com/office/drawing/2014/main" val="1457082074"/>
+                    </a:ext>
+                  </a:extLst>
+                </a:gridCol>
+                <a:gridCol w="2103120">
+                  <a:extLst>
+                    <a:ext uri="{9D8B030D-6E8A-4147-A177-3AD203B41FA5}">
+                      <a16:colId xmlns:a16="http://schemas.microsoft.com/office/drawing/2014/main" val="633438695"/>
+                    </a:ext>
+                  </a:extLst>
+                </a:gridCol>
+              </a:tblGrid>
+              <a:tr h="370840">
+                <a:tc>
+                  <a:txBody>
+                    <a:bodyPr/>
+                    <a:lstStyle/>
+                    <a:p>
+                      <a:r>
+                        <a:rPr lang="en-US" dirty="0"/>
+                        <a:t>Model</a:t>
+                      </a:r>
+                    </a:p>
+                  </a:txBody>
+                  <a:tcPr/>
+                </a:tc>
+                <a:tc>
+                  <a:txBody>
+                    <a:bodyPr/>
+                    <a:lstStyle/>
+                    <a:p>
+                      <a:r>
+                        <a:rPr lang="en-US" dirty="0"/>
+                        <a:t>Exponential growth</a:t>
+                      </a:r>
+                    </a:p>
+                  </a:txBody>
+                  <a:tcPr/>
+                </a:tc>
+                <a:tc>
+                  <a:txBody>
+                    <a:bodyPr/>
+                    <a:lstStyle/>
+                    <a:p>
+                      <a:r>
+                        <a:rPr lang="en-US" dirty="0"/>
+                        <a:t>Two-epoch</a:t>
+                      </a:r>
+                    </a:p>
+                  </a:txBody>
+                  <a:tcPr/>
+                </a:tc>
+                <a:tc>
+                  <a:txBody>
+                    <a:bodyPr/>
+                    <a:lstStyle/>
+                    <a:p>
+                      <a:r>
+                        <a:rPr lang="en-US" dirty="0"/>
+                        <a:t>Bottleneck + growth</a:t>
+                      </a:r>
+                    </a:p>
+                  </a:txBody>
+                  <a:tcPr/>
+                </a:tc>
+                <a:tc>
+                  <a:txBody>
+                    <a:bodyPr/>
+                    <a:lstStyle/>
+                    <a:p>
+                      <a:r>
+                        <a:rPr lang="en-US" dirty="0"/>
+                        <a:t>Three-epoch</a:t>
+                      </a:r>
+                    </a:p>
+                  </a:txBody>
+                  <a:tcPr/>
+                </a:tc>
+                <a:extLst>
+                  <a:ext uri="{0D108BD9-81ED-4DB2-BD59-A6C34878D82A}">
+                    <a16:rowId xmlns:a16="http://schemas.microsoft.com/office/drawing/2014/main" val="3143057051"/>
+                  </a:ext>
+                </a:extLst>
+              </a:tr>
+              <a:tr h="370840">
+                <a:tc>
+                  <a:txBody>
+                    <a:bodyPr/>
+                    <a:lstStyle/>
+                    <a:p>
+                      <a:r>
+                        <a:rPr lang="en-US" dirty="0"/>
+                        <a:t>Log Likelihood</a:t>
+                      </a:r>
+                    </a:p>
+                  </a:txBody>
+                  <a:tcPr/>
+                </a:tc>
+                <a:tc>
+                  <a:txBody>
+                    <a:bodyPr/>
+                    <a:lstStyle/>
+                    <a:p>
+                      <a:r>
+                        <a:rPr lang="en-US" dirty="0"/>
+                        <a:t>-127.936291202</a:t>
+                      </a:r>
+                    </a:p>
+                  </a:txBody>
+                  <a:tcPr/>
+                </a:tc>
+                <a:tc>
+                  <a:txBody>
+                    <a:bodyPr/>
+                    <a:lstStyle/>
+                    <a:p>
+                      <a:r>
+                        <a:rPr lang="en-US" dirty="0">
+                          <a:highlight>
+                            <a:srgbClr val="FFFF00"/>
+                          </a:highlight>
+                        </a:rPr>
+                        <a:t>-115.384987567</a:t>
+                      </a:r>
+                    </a:p>
+                  </a:txBody>
+                  <a:tcPr/>
+                </a:tc>
+                <a:tc>
+                  <a:txBody>
+                    <a:bodyPr/>
+                    <a:lstStyle/>
+                    <a:p>
+                      <a:r>
+                        <a:rPr lang="en-US" dirty="0"/>
+                        <a:t>-118.086979535</a:t>
+                      </a:r>
+                      <a:endParaRPr lang="en-US" dirty="0">
+                        <a:highlight>
+                          <a:srgbClr val="FFFF00"/>
+                        </a:highlight>
+                      </a:endParaRPr>
+                    </a:p>
+                  </a:txBody>
+                  <a:tcPr/>
+                </a:tc>
+                <a:tc>
+                  <a:txBody>
+                    <a:bodyPr/>
+                    <a:lstStyle/>
+                    <a:p>
+                      <a:r>
+                        <a:rPr lang="en-US" sz="1800" kern="1200" dirty="0">
+                          <a:solidFill>
+                            <a:schemeClr val="dk1"/>
+                          </a:solidFill>
+                          <a:latin typeface="+mn-lt"/>
+                          <a:ea typeface="+mn-ea"/>
+                          <a:cs typeface="+mn-cs"/>
+                        </a:rPr>
+                        <a:t>-116.530852345</a:t>
+                      </a:r>
+                      <a:endParaRPr lang="en-US" dirty="0"/>
+                    </a:p>
+                  </a:txBody>
+                  <a:tcPr/>
+                </a:tc>
+                <a:extLst>
+                  <a:ext uri="{0D108BD9-81ED-4DB2-BD59-A6C34878D82A}">
+                    <a16:rowId xmlns:a16="http://schemas.microsoft.com/office/drawing/2014/main" val="3235037204"/>
+                  </a:ext>
+                </a:extLst>
+              </a:tr>
+              <a:tr h="370840">
+                <a:tc>
+                  <a:txBody>
+                    <a:bodyPr/>
+                    <a:lstStyle/>
+                    <a:p>
+                      <a:r>
+                        <a:rPr lang="en-US" dirty="0" err="1"/>
+                        <a:t>Nu_a</a:t>
+                      </a:r>
+                      <a:endParaRPr lang="en-US" dirty="0"/>
+                    </a:p>
+                  </a:txBody>
+                  <a:tcPr/>
+                </a:tc>
+                <a:tc>
+                  <a:txBody>
+                    <a:bodyPr/>
+                    <a:lstStyle/>
+                    <a:p>
+                      <a:r>
+                        <a:rPr lang="en-US" dirty="0"/>
+                        <a:t>5.06496807</a:t>
+                      </a:r>
+                    </a:p>
+                  </a:txBody>
+                  <a:tcPr/>
+                </a:tc>
+                <a:tc>
+                  <a:txBody>
+                    <a:bodyPr/>
+                    <a:lstStyle/>
+                    <a:p>
+                      <a:r>
+                        <a:rPr lang="en-US" dirty="0"/>
+                        <a:t>1.44199393</a:t>
+                      </a:r>
+                    </a:p>
+                  </a:txBody>
+                  <a:tcPr/>
+                </a:tc>
+                <a:tc>
+                  <a:txBody>
+                    <a:bodyPr/>
+                    <a:lstStyle/>
+                    <a:p>
+                      <a:r>
+                        <a:rPr lang="en-US" dirty="0"/>
+                        <a:t>0.32927112</a:t>
+                      </a:r>
+                    </a:p>
+                  </a:txBody>
+                  <a:tcPr/>
+                </a:tc>
+                <a:tc>
+                  <a:txBody>
+                    <a:bodyPr/>
+                    <a:lstStyle/>
+                    <a:p>
+                      <a:r>
+                        <a:rPr lang="en-US" sz="1800" kern="1200" dirty="0">
+                          <a:solidFill>
+                            <a:schemeClr val="dk1"/>
+                          </a:solidFill>
+                          <a:latin typeface="+mn-lt"/>
+                          <a:ea typeface="+mn-ea"/>
+                          <a:cs typeface="+mn-cs"/>
+                        </a:rPr>
+                        <a:t>0.17552614</a:t>
+                      </a:r>
+                      <a:endParaRPr lang="en-US" dirty="0"/>
+                    </a:p>
+                  </a:txBody>
+                  <a:tcPr/>
+                </a:tc>
+                <a:extLst>
+                  <a:ext uri="{0D108BD9-81ED-4DB2-BD59-A6C34878D82A}">
+                    <a16:rowId xmlns:a16="http://schemas.microsoft.com/office/drawing/2014/main" val="2717148640"/>
+                  </a:ext>
+                </a:extLst>
+              </a:tr>
+              <a:tr h="370840">
+                <a:tc>
+                  <a:txBody>
+                    <a:bodyPr/>
+                    <a:lstStyle/>
+                    <a:p>
+                      <a:r>
+                        <a:rPr lang="en-US" dirty="0" err="1"/>
+                        <a:t>Nu_b</a:t>
+                      </a:r>
+                      <a:endParaRPr lang="en-US" dirty="0"/>
+                    </a:p>
+                  </a:txBody>
+                  <a:tcPr/>
+                </a:tc>
+                <a:tc>
+                  <a:txBody>
+                    <a:bodyPr/>
+                    <a:lstStyle/>
+                    <a:p>
+                      <a:r>
+                        <a:rPr lang="en-US" dirty="0"/>
+                        <a:t>N/A</a:t>
+                      </a:r>
+                    </a:p>
+                  </a:txBody>
+                  <a:tcPr/>
+                </a:tc>
+                <a:tc>
+                  <a:txBody>
+                    <a:bodyPr/>
+                    <a:lstStyle/>
+                    <a:p>
+                      <a:r>
+                        <a:rPr lang="en-US" dirty="0"/>
+                        <a:t>N/A</a:t>
+                      </a:r>
+                    </a:p>
+                  </a:txBody>
+                  <a:tcPr/>
+                </a:tc>
+                <a:tc>
+                  <a:txBody>
+                    <a:bodyPr/>
+                    <a:lstStyle/>
+                    <a:p>
+                      <a:r>
+                        <a:rPr lang="en-US" dirty="0"/>
+                        <a:t>1.86184541</a:t>
+                      </a:r>
+                    </a:p>
+                  </a:txBody>
+                  <a:tcPr/>
+                </a:tc>
+                <a:tc>
+                  <a:txBody>
+                    <a:bodyPr/>
+                    <a:lstStyle/>
+                    <a:p>
+                      <a:r>
+                        <a:rPr lang="en-US" sz="1800" kern="1200" dirty="0">
+                          <a:solidFill>
+                            <a:schemeClr val="dk1"/>
+                          </a:solidFill>
+                          <a:latin typeface="+mn-lt"/>
+                          <a:ea typeface="+mn-ea"/>
+                          <a:cs typeface="+mn-cs"/>
+                        </a:rPr>
+                        <a:t>0.60311634</a:t>
+                      </a:r>
+                      <a:endParaRPr lang="en-US" dirty="0"/>
+                    </a:p>
+                  </a:txBody>
+                  <a:tcPr/>
+                </a:tc>
+                <a:extLst>
+                  <a:ext uri="{0D108BD9-81ED-4DB2-BD59-A6C34878D82A}">
+                    <a16:rowId xmlns:a16="http://schemas.microsoft.com/office/drawing/2014/main" val="3992781458"/>
+                  </a:ext>
+                </a:extLst>
+              </a:tr>
+              <a:tr h="370840">
+                <a:tc>
+                  <a:txBody>
+                    <a:bodyPr/>
+                    <a:lstStyle/>
+                    <a:p>
+                      <a:r>
+                        <a:rPr lang="en-US" dirty="0"/>
+                        <a:t>T_12</a:t>
+                      </a:r>
+                    </a:p>
+                  </a:txBody>
+                  <a:tcPr/>
+                </a:tc>
+                <a:tc>
+                  <a:txBody>
+                    <a:bodyPr/>
+                    <a:lstStyle/>
+                    <a:p>
+                      <a:r>
+                        <a:rPr lang="en-US" dirty="0"/>
+                        <a:t>0.02285876</a:t>
+                      </a:r>
+                    </a:p>
+                  </a:txBody>
+                  <a:tcPr/>
+                </a:tc>
+                <a:tc>
+                  <a:txBody>
+                    <a:bodyPr/>
+                    <a:lstStyle/>
+                    <a:p>
+                      <a:r>
+                        <a:rPr lang="en-US" dirty="0"/>
+                        <a:t>0.23624364</a:t>
+                      </a:r>
+                    </a:p>
+                  </a:txBody>
+                  <a:tcPr/>
+                </a:tc>
+                <a:tc>
+                  <a:txBody>
+                    <a:bodyPr/>
+                    <a:lstStyle/>
+                    <a:p>
+                      <a:r>
+                        <a:rPr lang="en-US" dirty="0"/>
+                        <a:t>7.56831131</a:t>
+                      </a:r>
+                    </a:p>
+                  </a:txBody>
+                  <a:tcPr/>
+                </a:tc>
+                <a:tc>
+                  <a:txBody>
+                    <a:bodyPr/>
+                    <a:lstStyle/>
+                    <a:p>
+                      <a:r>
+                        <a:rPr lang="en-US" sz="1800" kern="1200" dirty="0">
+                          <a:solidFill>
+                            <a:schemeClr val="dk1"/>
+                          </a:solidFill>
+                          <a:latin typeface="+mn-lt"/>
+                          <a:ea typeface="+mn-ea"/>
+                          <a:cs typeface="+mn-cs"/>
+                        </a:rPr>
+                        <a:t>0.23296508</a:t>
+                      </a:r>
+                      <a:endParaRPr lang="en-US" dirty="0"/>
+                    </a:p>
+                  </a:txBody>
+                  <a:tcPr/>
+                </a:tc>
+                <a:extLst>
+                  <a:ext uri="{0D108BD9-81ED-4DB2-BD59-A6C34878D82A}">
+                    <a16:rowId xmlns:a16="http://schemas.microsoft.com/office/drawing/2014/main" val="3283572519"/>
+                  </a:ext>
+                </a:extLst>
+              </a:tr>
+              <a:tr h="370840">
+                <a:tc>
+                  <a:txBody>
+                    <a:bodyPr/>
+                    <a:lstStyle/>
+                    <a:p>
+                      <a:r>
+                        <a:rPr lang="en-US" dirty="0"/>
+                        <a:t>T_23</a:t>
+                      </a:r>
+                    </a:p>
+                  </a:txBody>
+                  <a:tcPr/>
+                </a:tc>
+                <a:tc>
+                  <a:txBody>
+                    <a:bodyPr/>
+                    <a:lstStyle/>
+                    <a:p>
+                      <a:r>
+                        <a:rPr lang="en-US" dirty="0"/>
+                        <a:t>N/A</a:t>
+                      </a:r>
+                    </a:p>
+                  </a:txBody>
+                  <a:tcPr/>
+                </a:tc>
+                <a:tc>
+                  <a:txBody>
+                    <a:bodyPr/>
+                    <a:lstStyle/>
+                    <a:p>
+                      <a:r>
+                        <a:rPr lang="en-US" dirty="0"/>
+                        <a:t>N/A</a:t>
+                      </a:r>
+                    </a:p>
+                  </a:txBody>
+                  <a:tcPr/>
+                </a:tc>
+                <a:tc>
+                  <a:txBody>
+                    <a:bodyPr/>
+                    <a:lstStyle/>
+                    <a:p>
+                      <a:r>
+                        <a:rPr lang="en-US" dirty="0"/>
+                        <a:t>N/A</a:t>
+                      </a:r>
+                    </a:p>
+                  </a:txBody>
+                  <a:tcPr/>
+                </a:tc>
+                <a:tc>
+                  <a:txBody>
+                    <a:bodyPr/>
+                    <a:lstStyle/>
+                    <a:p>
+                      <a:r>
+                        <a:rPr lang="en-US" sz="1800" kern="1200" dirty="0">
+                          <a:solidFill>
+                            <a:schemeClr val="dk1"/>
+                          </a:solidFill>
+                          <a:latin typeface="+mn-lt"/>
+                          <a:ea typeface="+mn-ea"/>
+                          <a:cs typeface="+mn-cs"/>
+                        </a:rPr>
+                        <a:t>0.24585277</a:t>
+                      </a:r>
+                      <a:endParaRPr lang="en-US" dirty="0"/>
+                    </a:p>
+                  </a:txBody>
+                  <a:tcPr/>
+                </a:tc>
+                <a:extLst>
+                  <a:ext uri="{0D108BD9-81ED-4DB2-BD59-A6C34878D82A}">
+                    <a16:rowId xmlns:a16="http://schemas.microsoft.com/office/drawing/2014/main" val="2422470866"/>
+                  </a:ext>
+                </a:extLst>
+              </a:tr>
+            </a:tbl>
+          </a:graphicData>
+        </a:graphic>
+      </p:graphicFrame>
+      <p:sp>
+        <p:nvSpPr>
+          <p:cNvPr id="7" name="TextBox 6">
+            <a:extLst>
+              <a:ext uri="{FF2B5EF4-FFF2-40B4-BE49-F238E27FC236}">
+                <a16:creationId xmlns:a16="http://schemas.microsoft.com/office/drawing/2014/main" id="{3E71FB0F-0EB4-45FF-86AA-08675F67D12A}"/>
+              </a:ext>
+            </a:extLst>
+          </p:cNvPr>
+          <p:cNvSpPr txBox="1"/>
+          <p:nvPr/>
+        </p:nvSpPr>
+        <p:spPr>
+          <a:xfrm>
+            <a:off x="7096453" y="1690688"/>
+            <a:ext cx="5095547" cy="1754326"/>
+          </a:xfrm>
+          <a:prstGeom prst="rect">
+            <a:avLst/>
+          </a:prstGeom>
+          <a:noFill/>
+        </p:spPr>
+        <p:txBody>
+          <a:bodyPr wrap="square" rtlCol="0">
+            <a:spAutoFit/>
+          </a:bodyPr>
+          <a:lstStyle/>
+          <a:p>
+            <a:pPr marL="285750" indent="-285750">
+              <a:buFont typeface="Arial" panose="020B0604020202020204" pitchFamily="34" charset="0"/>
+              <a:buChar char="•"/>
+            </a:pPr>
+            <a:r>
+              <a:rPr lang="en-US" dirty="0" err="1"/>
+              <a:t>Nu_a</a:t>
+            </a:r>
+            <a:r>
+              <a:rPr lang="en-US" dirty="0"/>
+              <a:t>: contemporary population relative to ancestral population before first epoch</a:t>
+            </a:r>
+          </a:p>
+          <a:p>
+            <a:pPr marL="285750" indent="-285750">
+              <a:buFont typeface="Arial" panose="020B0604020202020204" pitchFamily="34" charset="0"/>
+              <a:buChar char="•"/>
+            </a:pPr>
+            <a:r>
+              <a:rPr lang="en-US" dirty="0" err="1"/>
+              <a:t>Nu_b</a:t>
+            </a:r>
+            <a:r>
+              <a:rPr lang="en-US" dirty="0"/>
+              <a:t>: contemporary population relative to ancestral population before second epoch</a:t>
+            </a:r>
+          </a:p>
+          <a:p>
+            <a:pPr marL="285750" indent="-285750">
+              <a:buFont typeface="Arial" panose="020B0604020202020204" pitchFamily="34" charset="0"/>
+              <a:buChar char="•"/>
+            </a:pPr>
+            <a:r>
+              <a:rPr lang="en-US" dirty="0"/>
+              <a:t>T_1: Duration of first epoch (units of 2 * </a:t>
+            </a:r>
+            <a:r>
+              <a:rPr lang="en-US" dirty="0" err="1"/>
+              <a:t>N_a</a:t>
+            </a:r>
+            <a:r>
+              <a:rPr lang="en-US" dirty="0"/>
+              <a:t>)</a:t>
+            </a:r>
+          </a:p>
+          <a:p>
+            <a:pPr marL="285750" indent="-285750">
+              <a:buFont typeface="Arial" panose="020B0604020202020204" pitchFamily="34" charset="0"/>
+              <a:buChar char="•"/>
+            </a:pPr>
+            <a:r>
+              <a:rPr lang="en-US" dirty="0"/>
+              <a:t>T_2: Duration of second epoch (units of 2 * </a:t>
+            </a:r>
+            <a:r>
+              <a:rPr lang="en-US" dirty="0" err="1"/>
+              <a:t>N_a</a:t>
+            </a:r>
+            <a:r>
+              <a:rPr lang="en-US" dirty="0"/>
+              <a:t>)</a:t>
+            </a:r>
+          </a:p>
+        </p:txBody>
+      </p:sp>
     </p:spTree>
     <p:extLst>
       <p:ext uri="{BB962C8B-B14F-4D97-AF65-F5344CB8AC3E}">
-        <p14:creationId xmlns:p14="http://schemas.microsoft.com/office/powerpoint/2010/main" val="1253621506"/>
+        <p14:creationId xmlns:p14="http://schemas.microsoft.com/office/powerpoint/2010/main" val="1722285914"/>
       </p:ext>
     </p:extLst>
   </p:cSld>
@@ -5281,7 +7419,7 @@
           <p:cNvPr id="2" name="Title 1">
             <a:extLst>
               <a:ext uri="{FF2B5EF4-FFF2-40B4-BE49-F238E27FC236}">
-                <a16:creationId xmlns:a16="http://schemas.microsoft.com/office/drawing/2014/main" id="{9C91C0AA-C083-4488-8B2B-78453C8EDC36}"/>
+                <a16:creationId xmlns:a16="http://schemas.microsoft.com/office/drawing/2014/main" id="{FC0C9624-1DBB-4B7A-B446-0EC6DD7756EB}"/>
               </a:ext>
             </a:extLst>
           </p:cNvPr>
@@ -5299,11 +7437,11 @@
           <a:p>
             <a:r>
               <a:rPr lang="en-US" dirty="0"/>
-              <a:t>SFS for A. </a:t>
+              <a:t>Bacteroides </a:t>
             </a:r>
             <a:r>
               <a:rPr lang="en-US" dirty="0" err="1"/>
-              <a:t>putredinis</a:t>
+              <a:t>ovatus</a:t>
             </a:r>
             <a:endParaRPr lang="en-US" dirty="0"/>
           </a:p>
@@ -5311,10 +7449,10 @@
       </p:sp>
       <p:pic>
         <p:nvPicPr>
-          <p:cNvPr id="7" name="Picture 6">
-            <a:extLst>
-              <a:ext uri="{FF2B5EF4-FFF2-40B4-BE49-F238E27FC236}">
-                <a16:creationId xmlns:a16="http://schemas.microsoft.com/office/drawing/2014/main" id="{40162222-F6BC-4808-A3C2-2823F72BDE63}"/>
+          <p:cNvPr id="4" name="Picture 3">
+            <a:extLst>
+              <a:ext uri="{FF2B5EF4-FFF2-40B4-BE49-F238E27FC236}">
+                <a16:creationId xmlns:a16="http://schemas.microsoft.com/office/drawing/2014/main" id="{8865A12F-B336-4C8D-BF76-1BE69927E054}"/>
               </a:ext>
             </a:extLst>
           </p:cNvPr>
@@ -5331,18 +7469,626 @@
         </p:blipFill>
         <p:spPr>
           <a:xfrm>
-            <a:off x="0" y="1628241"/>
-            <a:ext cx="12192000" cy="4899378"/>
+            <a:off x="256878" y="1428443"/>
+            <a:ext cx="7420897" cy="3002841"/>
           </a:xfrm>
           <a:prstGeom prst="rect">
             <a:avLst/>
           </a:prstGeom>
         </p:spPr>
       </p:pic>
+      <p:graphicFrame>
+        <p:nvGraphicFramePr>
+          <p:cNvPr id="6" name="Table 4">
+            <a:extLst>
+              <a:ext uri="{FF2B5EF4-FFF2-40B4-BE49-F238E27FC236}">
+                <a16:creationId xmlns:a16="http://schemas.microsoft.com/office/drawing/2014/main" id="{A9705451-B491-4190-AD26-9043A7325C40}"/>
+              </a:ext>
+            </a:extLst>
+          </p:cNvPr>
+          <p:cNvGraphicFramePr>
+            <a:graphicFrameLocks noGrp="1"/>
+          </p:cNvGraphicFramePr>
+          <p:nvPr>
+            <p:ph idx="1"/>
+            <p:extLst>
+              <p:ext uri="{D42A27DB-BD31-4B8C-83A1-F6EECF244321}">
+                <p14:modId xmlns:p14="http://schemas.microsoft.com/office/powerpoint/2010/main" val="2197319629"/>
+              </p:ext>
+            </p:extLst>
+          </p:nvPr>
+        </p:nvGraphicFramePr>
+        <p:xfrm>
+          <a:off x="838200" y="4431284"/>
+          <a:ext cx="10515600" cy="2225040"/>
+        </p:xfrm>
+        <a:graphic>
+          <a:graphicData uri="http://schemas.openxmlformats.org/drawingml/2006/table">
+            <a:tbl>
+              <a:tblPr firstRow="1" bandRow="1">
+                <a:tableStyleId>{073A0DAA-6AF3-43AB-8588-CEC1D06C72B9}</a:tableStyleId>
+              </a:tblPr>
+              <a:tblGrid>
+                <a:gridCol w="2103120">
+                  <a:extLst>
+                    <a:ext uri="{9D8B030D-6E8A-4147-A177-3AD203B41FA5}">
+                      <a16:colId xmlns:a16="http://schemas.microsoft.com/office/drawing/2014/main" val="2900726404"/>
+                    </a:ext>
+                  </a:extLst>
+                </a:gridCol>
+                <a:gridCol w="2103120">
+                  <a:extLst>
+                    <a:ext uri="{9D8B030D-6E8A-4147-A177-3AD203B41FA5}">
+                      <a16:colId xmlns:a16="http://schemas.microsoft.com/office/drawing/2014/main" val="2297780930"/>
+                    </a:ext>
+                  </a:extLst>
+                </a:gridCol>
+                <a:gridCol w="2103120">
+                  <a:extLst>
+                    <a:ext uri="{9D8B030D-6E8A-4147-A177-3AD203B41FA5}">
+                      <a16:colId xmlns:a16="http://schemas.microsoft.com/office/drawing/2014/main" val="1352057416"/>
+                    </a:ext>
+                  </a:extLst>
+                </a:gridCol>
+                <a:gridCol w="2103120">
+                  <a:extLst>
+                    <a:ext uri="{9D8B030D-6E8A-4147-A177-3AD203B41FA5}">
+                      <a16:colId xmlns:a16="http://schemas.microsoft.com/office/drawing/2014/main" val="1457082074"/>
+                    </a:ext>
+                  </a:extLst>
+                </a:gridCol>
+                <a:gridCol w="2103120">
+                  <a:extLst>
+                    <a:ext uri="{9D8B030D-6E8A-4147-A177-3AD203B41FA5}">
+                      <a16:colId xmlns:a16="http://schemas.microsoft.com/office/drawing/2014/main" val="633438695"/>
+                    </a:ext>
+                  </a:extLst>
+                </a:gridCol>
+              </a:tblGrid>
+              <a:tr h="370840">
+                <a:tc>
+                  <a:txBody>
+                    <a:bodyPr/>
+                    <a:lstStyle/>
+                    <a:p>
+                      <a:r>
+                        <a:rPr lang="en-US" dirty="0"/>
+                        <a:t>Model</a:t>
+                      </a:r>
+                    </a:p>
+                  </a:txBody>
+                  <a:tcPr/>
+                </a:tc>
+                <a:tc>
+                  <a:txBody>
+                    <a:bodyPr/>
+                    <a:lstStyle/>
+                    <a:p>
+                      <a:r>
+                        <a:rPr lang="en-US" dirty="0"/>
+                        <a:t>Exponential growth</a:t>
+                      </a:r>
+                    </a:p>
+                  </a:txBody>
+                  <a:tcPr/>
+                </a:tc>
+                <a:tc>
+                  <a:txBody>
+                    <a:bodyPr/>
+                    <a:lstStyle/>
+                    <a:p>
+                      <a:r>
+                        <a:rPr lang="en-US" dirty="0"/>
+                        <a:t>Two-epoch</a:t>
+                      </a:r>
+                    </a:p>
+                  </a:txBody>
+                  <a:tcPr/>
+                </a:tc>
+                <a:tc>
+                  <a:txBody>
+                    <a:bodyPr/>
+                    <a:lstStyle/>
+                    <a:p>
+                      <a:r>
+                        <a:rPr lang="en-US" dirty="0"/>
+                        <a:t>Bottleneck + growth</a:t>
+                      </a:r>
+                    </a:p>
+                  </a:txBody>
+                  <a:tcPr/>
+                </a:tc>
+                <a:tc>
+                  <a:txBody>
+                    <a:bodyPr/>
+                    <a:lstStyle/>
+                    <a:p>
+                      <a:r>
+                        <a:rPr lang="en-US" dirty="0"/>
+                        <a:t>Three-epoch</a:t>
+                      </a:r>
+                    </a:p>
+                  </a:txBody>
+                  <a:tcPr/>
+                </a:tc>
+                <a:extLst>
+                  <a:ext uri="{0D108BD9-81ED-4DB2-BD59-A6C34878D82A}">
+                    <a16:rowId xmlns:a16="http://schemas.microsoft.com/office/drawing/2014/main" val="3143057051"/>
+                  </a:ext>
+                </a:extLst>
+              </a:tr>
+              <a:tr h="370840">
+                <a:tc>
+                  <a:txBody>
+                    <a:bodyPr/>
+                    <a:lstStyle/>
+                    <a:p>
+                      <a:r>
+                        <a:rPr lang="en-US" dirty="0"/>
+                        <a:t>Log Likelihood</a:t>
+                      </a:r>
+                    </a:p>
+                  </a:txBody>
+                  <a:tcPr/>
+                </a:tc>
+                <a:tc>
+                  <a:txBody>
+                    <a:bodyPr/>
+                    <a:lstStyle/>
+                    <a:p>
+                      <a:r>
+                        <a:rPr lang="en-US" dirty="0"/>
+                        <a:t>-119.348788944</a:t>
+                      </a:r>
+                    </a:p>
+                  </a:txBody>
+                  <a:tcPr/>
+                </a:tc>
+                <a:tc>
+                  <a:txBody>
+                    <a:bodyPr/>
+                    <a:lstStyle/>
+                    <a:p>
+                      <a:r>
+                        <a:rPr lang="en-US" dirty="0">
+                          <a:highlight>
+                            <a:srgbClr val="FFFF00"/>
+                          </a:highlight>
+                        </a:rPr>
+                        <a:t>-112.924572671</a:t>
+                      </a:r>
+                    </a:p>
+                  </a:txBody>
+                  <a:tcPr/>
+                </a:tc>
+                <a:tc>
+                  <a:txBody>
+                    <a:bodyPr/>
+                    <a:lstStyle/>
+                    <a:p>
+                      <a:r>
+                        <a:rPr lang="en-US" dirty="0"/>
+                        <a:t>-113.082924889</a:t>
+                      </a:r>
+                      <a:endParaRPr lang="en-US" dirty="0">
+                        <a:highlight>
+                          <a:srgbClr val="FFFF00"/>
+                        </a:highlight>
+                      </a:endParaRPr>
+                    </a:p>
+                  </a:txBody>
+                  <a:tcPr/>
+                </a:tc>
+                <a:tc>
+                  <a:txBody>
+                    <a:bodyPr/>
+                    <a:lstStyle/>
+                    <a:p>
+                      <a:r>
+                        <a:rPr lang="en-US" dirty="0"/>
+                        <a:t>-113.060715703</a:t>
+                      </a:r>
+                    </a:p>
+                  </a:txBody>
+                  <a:tcPr/>
+                </a:tc>
+                <a:extLst>
+                  <a:ext uri="{0D108BD9-81ED-4DB2-BD59-A6C34878D82A}">
+                    <a16:rowId xmlns:a16="http://schemas.microsoft.com/office/drawing/2014/main" val="3235037204"/>
+                  </a:ext>
+                </a:extLst>
+              </a:tr>
+              <a:tr h="370840">
+                <a:tc>
+                  <a:txBody>
+                    <a:bodyPr/>
+                    <a:lstStyle/>
+                    <a:p>
+                      <a:r>
+                        <a:rPr lang="en-US" dirty="0" err="1"/>
+                        <a:t>Nu_a</a:t>
+                      </a:r>
+                      <a:endParaRPr lang="en-US" dirty="0"/>
+                    </a:p>
+                  </a:txBody>
+                  <a:tcPr/>
+                </a:tc>
+                <a:tc>
+                  <a:txBody>
+                    <a:bodyPr/>
+                    <a:lstStyle/>
+                    <a:p>
+                      <a:r>
+                        <a:rPr lang="en-US" dirty="0"/>
+                        <a:t>1.43394881</a:t>
+                      </a:r>
+                    </a:p>
+                  </a:txBody>
+                  <a:tcPr/>
+                </a:tc>
+                <a:tc>
+                  <a:txBody>
+                    <a:bodyPr/>
+                    <a:lstStyle/>
+                    <a:p>
+                      <a:r>
+                        <a:rPr lang="en-US" dirty="0"/>
+                        <a:t>1.4790958</a:t>
+                      </a:r>
+                    </a:p>
+                  </a:txBody>
+                  <a:tcPr/>
+                </a:tc>
+                <a:tc>
+                  <a:txBody>
+                    <a:bodyPr/>
+                    <a:lstStyle/>
+                    <a:p>
+                      <a:r>
+                        <a:rPr lang="en-US" dirty="0"/>
+                        <a:t>1.46992089</a:t>
+                      </a:r>
+                    </a:p>
+                  </a:txBody>
+                  <a:tcPr/>
+                </a:tc>
+                <a:tc>
+                  <a:txBody>
+                    <a:bodyPr/>
+                    <a:lstStyle/>
+                    <a:p>
+                      <a:r>
+                        <a:rPr lang="en-US" dirty="0"/>
+                        <a:t>1.33943782</a:t>
+                      </a:r>
+                    </a:p>
+                  </a:txBody>
+                  <a:tcPr/>
+                </a:tc>
+                <a:extLst>
+                  <a:ext uri="{0D108BD9-81ED-4DB2-BD59-A6C34878D82A}">
+                    <a16:rowId xmlns:a16="http://schemas.microsoft.com/office/drawing/2014/main" val="2717148640"/>
+                  </a:ext>
+                </a:extLst>
+              </a:tr>
+              <a:tr h="370840">
+                <a:tc>
+                  <a:txBody>
+                    <a:bodyPr/>
+                    <a:lstStyle/>
+                    <a:p>
+                      <a:r>
+                        <a:rPr lang="en-US" dirty="0" err="1"/>
+                        <a:t>Nu_b</a:t>
+                      </a:r>
+                      <a:endParaRPr lang="en-US" dirty="0"/>
+                    </a:p>
+                  </a:txBody>
+                  <a:tcPr/>
+                </a:tc>
+                <a:tc>
+                  <a:txBody>
+                    <a:bodyPr/>
+                    <a:lstStyle/>
+                    <a:p>
+                      <a:r>
+                        <a:rPr lang="en-US" dirty="0"/>
+                        <a:t>N/A</a:t>
+                      </a:r>
+                    </a:p>
+                  </a:txBody>
+                  <a:tcPr/>
+                </a:tc>
+                <a:tc>
+                  <a:txBody>
+                    <a:bodyPr/>
+                    <a:lstStyle/>
+                    <a:p>
+                      <a:r>
+                        <a:rPr lang="en-US" dirty="0"/>
+                        <a:t>N/A</a:t>
+                      </a:r>
+                    </a:p>
+                  </a:txBody>
+                  <a:tcPr/>
+                </a:tc>
+                <a:tc>
+                  <a:txBody>
+                    <a:bodyPr/>
+                    <a:lstStyle/>
+                    <a:p>
+                      <a:r>
+                        <a:rPr lang="en-US" dirty="0"/>
+                        <a:t>1.42640515</a:t>
+                      </a:r>
+                    </a:p>
+                  </a:txBody>
+                  <a:tcPr/>
+                </a:tc>
+                <a:tc>
+                  <a:txBody>
+                    <a:bodyPr/>
+                    <a:lstStyle/>
+                    <a:p>
+                      <a:r>
+                        <a:rPr lang="en-US" dirty="0"/>
+                        <a:t>1.44808057</a:t>
+                      </a:r>
+                    </a:p>
+                  </a:txBody>
+                  <a:tcPr/>
+                </a:tc>
+                <a:extLst>
+                  <a:ext uri="{0D108BD9-81ED-4DB2-BD59-A6C34878D82A}">
+                    <a16:rowId xmlns:a16="http://schemas.microsoft.com/office/drawing/2014/main" val="3992781458"/>
+                  </a:ext>
+                </a:extLst>
+              </a:tr>
+              <a:tr h="370840">
+                <a:tc>
+                  <a:txBody>
+                    <a:bodyPr/>
+                    <a:lstStyle/>
+                    <a:p>
+                      <a:r>
+                        <a:rPr lang="en-US" dirty="0"/>
+                        <a:t>T_12</a:t>
+                      </a:r>
+                    </a:p>
+                  </a:txBody>
+                  <a:tcPr/>
+                </a:tc>
+                <a:tc>
+                  <a:txBody>
+                    <a:bodyPr/>
+                    <a:lstStyle/>
+                    <a:p>
+                      <a:r>
+                        <a:rPr lang="en-US" dirty="0"/>
+                        <a:t>0.3079758</a:t>
+                      </a:r>
+                    </a:p>
+                  </a:txBody>
+                  <a:tcPr/>
+                </a:tc>
+                <a:tc>
+                  <a:txBody>
+                    <a:bodyPr/>
+                    <a:lstStyle/>
+                    <a:p>
+                      <a:r>
+                        <a:rPr lang="en-US" dirty="0"/>
+                        <a:t>0.70549535</a:t>
+                      </a:r>
+                    </a:p>
+                  </a:txBody>
+                  <a:tcPr/>
+                </a:tc>
+                <a:tc>
+                  <a:txBody>
+                    <a:bodyPr/>
+                    <a:lstStyle/>
+                    <a:p>
+                      <a:r>
+                        <a:rPr lang="en-US" dirty="0"/>
+                        <a:t>0.61551285</a:t>
+                      </a:r>
+                    </a:p>
+                  </a:txBody>
+                  <a:tcPr/>
+                </a:tc>
+                <a:tc>
+                  <a:txBody>
+                    <a:bodyPr/>
+                    <a:lstStyle/>
+                    <a:p>
+                      <a:r>
+                        <a:rPr lang="en-US" dirty="0"/>
+                        <a:t>0.29004047</a:t>
+                      </a:r>
+                    </a:p>
+                  </a:txBody>
+                  <a:tcPr/>
+                </a:tc>
+                <a:extLst>
+                  <a:ext uri="{0D108BD9-81ED-4DB2-BD59-A6C34878D82A}">
+                    <a16:rowId xmlns:a16="http://schemas.microsoft.com/office/drawing/2014/main" val="3283572519"/>
+                  </a:ext>
+                </a:extLst>
+              </a:tr>
+              <a:tr h="370840">
+                <a:tc>
+                  <a:txBody>
+                    <a:bodyPr/>
+                    <a:lstStyle/>
+                    <a:p>
+                      <a:r>
+                        <a:rPr lang="en-US" dirty="0"/>
+                        <a:t>T_23</a:t>
+                      </a:r>
+                    </a:p>
+                  </a:txBody>
+                  <a:tcPr/>
+                </a:tc>
+                <a:tc>
+                  <a:txBody>
+                    <a:bodyPr/>
+                    <a:lstStyle/>
+                    <a:p>
+                      <a:r>
+                        <a:rPr lang="en-US" dirty="0"/>
+                        <a:t>N/A</a:t>
+                      </a:r>
+                    </a:p>
+                  </a:txBody>
+                  <a:tcPr/>
+                </a:tc>
+                <a:tc>
+                  <a:txBody>
+                    <a:bodyPr/>
+                    <a:lstStyle/>
+                    <a:p>
+                      <a:r>
+                        <a:rPr lang="en-US" dirty="0"/>
+                        <a:t>N/A</a:t>
+                      </a:r>
+                    </a:p>
+                  </a:txBody>
+                  <a:tcPr/>
+                </a:tc>
+                <a:tc>
+                  <a:txBody>
+                    <a:bodyPr/>
+                    <a:lstStyle/>
+                    <a:p>
+                      <a:r>
+                        <a:rPr lang="en-US" dirty="0"/>
+                        <a:t>N/A</a:t>
+                      </a:r>
+                    </a:p>
+                  </a:txBody>
+                  <a:tcPr/>
+                </a:tc>
+                <a:tc>
+                  <a:txBody>
+                    <a:bodyPr/>
+                    <a:lstStyle/>
+                    <a:p>
+                      <a:r>
+                        <a:rPr lang="en-US" dirty="0"/>
+                        <a:t>0.38515666</a:t>
+                      </a:r>
+                    </a:p>
+                  </a:txBody>
+                  <a:tcPr/>
+                </a:tc>
+                <a:extLst>
+                  <a:ext uri="{0D108BD9-81ED-4DB2-BD59-A6C34878D82A}">
+                    <a16:rowId xmlns:a16="http://schemas.microsoft.com/office/drawing/2014/main" val="2422470866"/>
+                  </a:ext>
+                </a:extLst>
+              </a:tr>
+            </a:tbl>
+          </a:graphicData>
+        </a:graphic>
+      </p:graphicFrame>
+      <p:sp>
+        <p:nvSpPr>
+          <p:cNvPr id="7" name="TextBox 6">
+            <a:extLst>
+              <a:ext uri="{FF2B5EF4-FFF2-40B4-BE49-F238E27FC236}">
+                <a16:creationId xmlns:a16="http://schemas.microsoft.com/office/drawing/2014/main" id="{8769094E-C9E5-486A-8807-B68125BFE64A}"/>
+              </a:ext>
+            </a:extLst>
+          </p:cNvPr>
+          <p:cNvSpPr txBox="1"/>
+          <p:nvPr/>
+        </p:nvSpPr>
+        <p:spPr>
+          <a:xfrm>
+            <a:off x="7096453" y="1690688"/>
+            <a:ext cx="5095547" cy="1754326"/>
+          </a:xfrm>
+          <a:prstGeom prst="rect">
+            <a:avLst/>
+          </a:prstGeom>
+          <a:noFill/>
+        </p:spPr>
+        <p:txBody>
+          <a:bodyPr wrap="square" rtlCol="0">
+            <a:spAutoFit/>
+          </a:bodyPr>
+          <a:lstStyle/>
+          <a:p>
+            <a:pPr marL="285750" indent="-285750">
+              <a:buFont typeface="Arial" panose="020B0604020202020204" pitchFamily="34" charset="0"/>
+              <a:buChar char="•"/>
+            </a:pPr>
+            <a:r>
+              <a:rPr lang="en-US" dirty="0" err="1"/>
+              <a:t>Nu_a</a:t>
+            </a:r>
+            <a:r>
+              <a:rPr lang="en-US" dirty="0"/>
+              <a:t>: contemporary population relative to ancestral population before first epoch</a:t>
+            </a:r>
+          </a:p>
+          <a:p>
+            <a:pPr marL="285750" indent="-285750">
+              <a:buFont typeface="Arial" panose="020B0604020202020204" pitchFamily="34" charset="0"/>
+              <a:buChar char="•"/>
+            </a:pPr>
+            <a:r>
+              <a:rPr lang="en-US" dirty="0" err="1"/>
+              <a:t>Nu_b</a:t>
+            </a:r>
+            <a:r>
+              <a:rPr lang="en-US" dirty="0"/>
+              <a:t>: contemporary population relative to ancestral population before second epoch</a:t>
+            </a:r>
+          </a:p>
+          <a:p>
+            <a:pPr marL="285750" indent="-285750">
+              <a:buFont typeface="Arial" panose="020B0604020202020204" pitchFamily="34" charset="0"/>
+              <a:buChar char="•"/>
+            </a:pPr>
+            <a:r>
+              <a:rPr lang="en-US" dirty="0"/>
+              <a:t>T_1: Duration of first epoch (units of 2 * </a:t>
+            </a:r>
+            <a:r>
+              <a:rPr lang="en-US" dirty="0" err="1"/>
+              <a:t>N_a</a:t>
+            </a:r>
+            <a:r>
+              <a:rPr lang="en-US" dirty="0"/>
+              <a:t>)</a:t>
+            </a:r>
+          </a:p>
+          <a:p>
+            <a:pPr marL="285750" indent="-285750">
+              <a:buFont typeface="Arial" panose="020B0604020202020204" pitchFamily="34" charset="0"/>
+              <a:buChar char="•"/>
+            </a:pPr>
+            <a:r>
+              <a:rPr lang="en-US" dirty="0"/>
+              <a:t>T_2: Duration of second epoch (units of 2 * </a:t>
+            </a:r>
+            <a:r>
+              <a:rPr lang="en-US" dirty="0" err="1"/>
+              <a:t>N_a</a:t>
+            </a:r>
+            <a:r>
+              <a:rPr lang="en-US" dirty="0"/>
+              <a:t>)</a:t>
+            </a:r>
+          </a:p>
+        </p:txBody>
+      </p:sp>
     </p:spTree>
     <p:extLst>
       <p:ext uri="{BB962C8B-B14F-4D97-AF65-F5344CB8AC3E}">
-        <p14:creationId xmlns:p14="http://schemas.microsoft.com/office/powerpoint/2010/main" val="2158360289"/>
+        <p14:creationId xmlns:p14="http://schemas.microsoft.com/office/powerpoint/2010/main" val="534063524"/>
       </p:ext>
     </p:extLst>
   </p:cSld>
@@ -5374,7 +8120,7 @@
           <p:cNvPr id="2" name="Title 1">
             <a:extLst>
               <a:ext uri="{FF2B5EF4-FFF2-40B4-BE49-F238E27FC236}">
-                <a16:creationId xmlns:a16="http://schemas.microsoft.com/office/drawing/2014/main" id="{9C91C0AA-C083-4488-8B2B-78453C8EDC36}"/>
+                <a16:creationId xmlns:a16="http://schemas.microsoft.com/office/drawing/2014/main" id="{FC0C9624-1DBB-4B7A-B446-0EC6DD7756EB}"/>
               </a:ext>
             </a:extLst>
           </p:cNvPr>
@@ -5391,12 +8137,16 @@
           <a:lstStyle/>
           <a:p>
             <a:r>
+              <a:rPr lang="en-US" dirty="0" err="1"/>
+              <a:t>Alistipes</a:t>
+            </a:r>
+            <a:r>
               <a:rPr lang="en-US" dirty="0"/>
-              <a:t>SFS for E. </a:t>
+              <a:t> </a:t>
             </a:r>
             <a:r>
               <a:rPr lang="en-US" dirty="0" err="1"/>
-              <a:t>rectale</a:t>
+              <a:t>putredinis</a:t>
             </a:r>
             <a:endParaRPr lang="en-US" dirty="0"/>
           </a:p>
@@ -5404,10 +8154,10 @@
       </p:sp>
       <p:pic>
         <p:nvPicPr>
-          <p:cNvPr id="4" name="Picture 3">
-            <a:extLst>
-              <a:ext uri="{FF2B5EF4-FFF2-40B4-BE49-F238E27FC236}">
-                <a16:creationId xmlns:a16="http://schemas.microsoft.com/office/drawing/2014/main" id="{4307A9BB-8EE2-4934-B8A3-32CE318E24AD}"/>
+          <p:cNvPr id="5" name="Picture 4">
+            <a:extLst>
+              <a:ext uri="{FF2B5EF4-FFF2-40B4-BE49-F238E27FC236}">
+                <a16:creationId xmlns:a16="http://schemas.microsoft.com/office/drawing/2014/main" id="{F3BC6FCC-6644-42E6-95F0-9583E821429C}"/>
               </a:ext>
             </a:extLst>
           </p:cNvPr>
@@ -5424,18 +8174,709 @@
         </p:blipFill>
         <p:spPr>
           <a:xfrm>
-            <a:off x="0" y="1969129"/>
-            <a:ext cx="12192000" cy="4888871"/>
+            <a:off x="153870" y="1396409"/>
+            <a:ext cx="7272953" cy="3001130"/>
           </a:xfrm>
           <a:prstGeom prst="rect">
             <a:avLst/>
           </a:prstGeom>
         </p:spPr>
       </p:pic>
+      <p:graphicFrame>
+        <p:nvGraphicFramePr>
+          <p:cNvPr id="4" name="Table 4">
+            <a:extLst>
+              <a:ext uri="{FF2B5EF4-FFF2-40B4-BE49-F238E27FC236}">
+                <a16:creationId xmlns:a16="http://schemas.microsoft.com/office/drawing/2014/main" id="{CED22545-7642-43E5-9E8E-C73593CC5F0F}"/>
+              </a:ext>
+            </a:extLst>
+          </p:cNvPr>
+          <p:cNvGraphicFramePr>
+            <a:graphicFrameLocks noGrp="1"/>
+          </p:cNvGraphicFramePr>
+          <p:nvPr>
+            <p:ph idx="1"/>
+            <p:extLst>
+              <p:ext uri="{D42A27DB-BD31-4B8C-83A1-F6EECF244321}">
+                <p14:modId xmlns:p14="http://schemas.microsoft.com/office/powerpoint/2010/main" val="1777659312"/>
+              </p:ext>
+            </p:extLst>
+          </p:nvPr>
+        </p:nvGraphicFramePr>
+        <p:xfrm>
+          <a:off x="828368" y="4397539"/>
+          <a:ext cx="10515600" cy="2225040"/>
+        </p:xfrm>
+        <a:graphic>
+          <a:graphicData uri="http://schemas.openxmlformats.org/drawingml/2006/table">
+            <a:tbl>
+              <a:tblPr firstRow="1" bandRow="1">
+                <a:tableStyleId>{073A0DAA-6AF3-43AB-8588-CEC1D06C72B9}</a:tableStyleId>
+              </a:tblPr>
+              <a:tblGrid>
+                <a:gridCol w="2103120">
+                  <a:extLst>
+                    <a:ext uri="{9D8B030D-6E8A-4147-A177-3AD203B41FA5}">
+                      <a16:colId xmlns:a16="http://schemas.microsoft.com/office/drawing/2014/main" val="2900726404"/>
+                    </a:ext>
+                  </a:extLst>
+                </a:gridCol>
+                <a:gridCol w="2103120">
+                  <a:extLst>
+                    <a:ext uri="{9D8B030D-6E8A-4147-A177-3AD203B41FA5}">
+                      <a16:colId xmlns:a16="http://schemas.microsoft.com/office/drawing/2014/main" val="2297780930"/>
+                    </a:ext>
+                  </a:extLst>
+                </a:gridCol>
+                <a:gridCol w="2103120">
+                  <a:extLst>
+                    <a:ext uri="{9D8B030D-6E8A-4147-A177-3AD203B41FA5}">
+                      <a16:colId xmlns:a16="http://schemas.microsoft.com/office/drawing/2014/main" val="1352057416"/>
+                    </a:ext>
+                  </a:extLst>
+                </a:gridCol>
+                <a:gridCol w="2103120">
+                  <a:extLst>
+                    <a:ext uri="{9D8B030D-6E8A-4147-A177-3AD203B41FA5}">
+                      <a16:colId xmlns:a16="http://schemas.microsoft.com/office/drawing/2014/main" val="1457082074"/>
+                    </a:ext>
+                  </a:extLst>
+                </a:gridCol>
+                <a:gridCol w="2103120">
+                  <a:extLst>
+                    <a:ext uri="{9D8B030D-6E8A-4147-A177-3AD203B41FA5}">
+                      <a16:colId xmlns:a16="http://schemas.microsoft.com/office/drawing/2014/main" val="633438695"/>
+                    </a:ext>
+                  </a:extLst>
+                </a:gridCol>
+              </a:tblGrid>
+              <a:tr h="370840">
+                <a:tc>
+                  <a:txBody>
+                    <a:bodyPr/>
+                    <a:lstStyle/>
+                    <a:p>
+                      <a:r>
+                        <a:rPr lang="en-US" dirty="0"/>
+                        <a:t>Model</a:t>
+                      </a:r>
+                    </a:p>
+                  </a:txBody>
+                  <a:tcPr/>
+                </a:tc>
+                <a:tc>
+                  <a:txBody>
+                    <a:bodyPr/>
+                    <a:lstStyle/>
+                    <a:p>
+                      <a:r>
+                        <a:rPr lang="en-US" dirty="0"/>
+                        <a:t>Exponential growth</a:t>
+                      </a:r>
+                    </a:p>
+                  </a:txBody>
+                  <a:tcPr/>
+                </a:tc>
+                <a:tc>
+                  <a:txBody>
+                    <a:bodyPr/>
+                    <a:lstStyle/>
+                    <a:p>
+                      <a:r>
+                        <a:rPr lang="en-US" dirty="0"/>
+                        <a:t>Two-epoch</a:t>
+                      </a:r>
+                    </a:p>
+                  </a:txBody>
+                  <a:tcPr/>
+                </a:tc>
+                <a:tc>
+                  <a:txBody>
+                    <a:bodyPr/>
+                    <a:lstStyle/>
+                    <a:p>
+                      <a:r>
+                        <a:rPr lang="en-US" dirty="0"/>
+                        <a:t>Bottleneck + growth</a:t>
+                      </a:r>
+                    </a:p>
+                  </a:txBody>
+                  <a:tcPr/>
+                </a:tc>
+                <a:tc>
+                  <a:txBody>
+                    <a:bodyPr/>
+                    <a:lstStyle/>
+                    <a:p>
+                      <a:r>
+                        <a:rPr lang="en-US" dirty="0"/>
+                        <a:t>Three-epoch</a:t>
+                      </a:r>
+                    </a:p>
+                  </a:txBody>
+                  <a:tcPr/>
+                </a:tc>
+                <a:extLst>
+                  <a:ext uri="{0D108BD9-81ED-4DB2-BD59-A6C34878D82A}">
+                    <a16:rowId xmlns:a16="http://schemas.microsoft.com/office/drawing/2014/main" val="3143057051"/>
+                  </a:ext>
+                </a:extLst>
+              </a:tr>
+              <a:tr h="370840">
+                <a:tc>
+                  <a:txBody>
+                    <a:bodyPr/>
+                    <a:lstStyle/>
+                    <a:p>
+                      <a:r>
+                        <a:rPr lang="en-US" dirty="0"/>
+                        <a:t>Log Likelihood</a:t>
+                      </a:r>
+                    </a:p>
+                  </a:txBody>
+                  <a:tcPr/>
+                </a:tc>
+                <a:tc>
+                  <a:txBody>
+                    <a:bodyPr/>
+                    <a:lstStyle/>
+                    <a:p>
+                      <a:r>
+                        <a:rPr lang="en-US" dirty="0"/>
+                        <a:t>-417.014902652</a:t>
+                      </a:r>
+                    </a:p>
+                  </a:txBody>
+                  <a:tcPr/>
+                </a:tc>
+                <a:tc>
+                  <a:txBody>
+                    <a:bodyPr/>
+                    <a:lstStyle/>
+                    <a:p>
+                      <a:r>
+                        <a:rPr lang="en-US" dirty="0">
+                          <a:highlight>
+                            <a:srgbClr val="FFFF00"/>
+                          </a:highlight>
+                        </a:rPr>
+                        <a:t>-283.836375864</a:t>
+                      </a:r>
+                    </a:p>
+                  </a:txBody>
+                  <a:tcPr/>
+                </a:tc>
+                <a:tc>
+                  <a:txBody>
+                    <a:bodyPr/>
+                    <a:lstStyle/>
+                    <a:p>
+                      <a:r>
+                        <a:rPr lang="en-US" dirty="0">
+                          <a:solidFill>
+                            <a:srgbClr val="FF0000"/>
+                          </a:solidFill>
+                        </a:rPr>
+                        <a:t>-1666.69273895</a:t>
+                      </a:r>
+                      <a:endParaRPr lang="en-US" dirty="0">
+                        <a:solidFill>
+                          <a:srgbClr val="FF0000"/>
+                        </a:solidFill>
+                        <a:highlight>
+                          <a:srgbClr val="FFFF00"/>
+                        </a:highlight>
+                      </a:endParaRPr>
+                    </a:p>
+                  </a:txBody>
+                  <a:tcPr/>
+                </a:tc>
+                <a:tc>
+                  <a:txBody>
+                    <a:bodyPr/>
+                    <a:lstStyle/>
+                    <a:p>
+                      <a:r>
+                        <a:rPr lang="en-US" sz="1800" kern="1200" dirty="0">
+                          <a:solidFill>
+                            <a:srgbClr val="FF0000"/>
+                          </a:solidFill>
+                          <a:latin typeface="+mn-lt"/>
+                          <a:ea typeface="+mn-ea"/>
+                          <a:cs typeface="+mn-cs"/>
+                        </a:rPr>
+                        <a:t>-1670.63816752</a:t>
+                      </a:r>
+                      <a:endParaRPr lang="en-US" dirty="0">
+                        <a:solidFill>
+                          <a:srgbClr val="FF0000"/>
+                        </a:solidFill>
+                      </a:endParaRPr>
+                    </a:p>
+                  </a:txBody>
+                  <a:tcPr/>
+                </a:tc>
+                <a:extLst>
+                  <a:ext uri="{0D108BD9-81ED-4DB2-BD59-A6C34878D82A}">
+                    <a16:rowId xmlns:a16="http://schemas.microsoft.com/office/drawing/2014/main" val="3235037204"/>
+                  </a:ext>
+                </a:extLst>
+              </a:tr>
+              <a:tr h="370840">
+                <a:tc>
+                  <a:txBody>
+                    <a:bodyPr/>
+                    <a:lstStyle/>
+                    <a:p>
+                      <a:r>
+                        <a:rPr lang="en-US" dirty="0" err="1"/>
+                        <a:t>Nu_a</a:t>
+                      </a:r>
+                      <a:endParaRPr lang="en-US" dirty="0"/>
+                    </a:p>
+                  </a:txBody>
+                  <a:tcPr/>
+                </a:tc>
+                <a:tc>
+                  <a:txBody>
+                    <a:bodyPr/>
+                    <a:lstStyle/>
+                    <a:p>
+                      <a:r>
+                        <a:rPr lang="en-US" dirty="0"/>
+                        <a:t>37.70628513</a:t>
+                      </a:r>
+                    </a:p>
+                  </a:txBody>
+                  <a:tcPr/>
+                </a:tc>
+                <a:tc>
+                  <a:txBody>
+                    <a:bodyPr/>
+                    <a:lstStyle/>
+                    <a:p>
+                      <a:r>
+                        <a:rPr lang="en-US" dirty="0"/>
+                        <a:t>12.85982032</a:t>
+                      </a:r>
+                    </a:p>
+                  </a:txBody>
+                  <a:tcPr/>
+                </a:tc>
+                <a:tc>
+                  <a:txBody>
+                    <a:bodyPr/>
+                    <a:lstStyle/>
+                    <a:p>
+                      <a:r>
+                        <a:rPr lang="en-US" dirty="0">
+                          <a:solidFill>
+                            <a:srgbClr val="FF0000"/>
+                          </a:solidFill>
+                        </a:rPr>
+                        <a:t>2.72608089e-01</a:t>
+                      </a:r>
+                    </a:p>
+                  </a:txBody>
+                  <a:tcPr/>
+                </a:tc>
+                <a:tc>
+                  <a:txBody>
+                    <a:bodyPr/>
+                    <a:lstStyle/>
+                    <a:p>
+                      <a:r>
+                        <a:rPr lang="en-US" sz="1800" kern="1200" dirty="0">
+                          <a:solidFill>
+                            <a:srgbClr val="FF0000"/>
+                          </a:solidFill>
+                          <a:latin typeface="+mn-lt"/>
+                          <a:ea typeface="+mn-ea"/>
+                          <a:cs typeface="+mn-cs"/>
+                        </a:rPr>
+                        <a:t>0.40136306</a:t>
+                      </a:r>
+                      <a:endParaRPr lang="en-US" dirty="0">
+                        <a:solidFill>
+                          <a:srgbClr val="FF0000"/>
+                        </a:solidFill>
+                      </a:endParaRPr>
+                    </a:p>
+                  </a:txBody>
+                  <a:tcPr/>
+                </a:tc>
+                <a:extLst>
+                  <a:ext uri="{0D108BD9-81ED-4DB2-BD59-A6C34878D82A}">
+                    <a16:rowId xmlns:a16="http://schemas.microsoft.com/office/drawing/2014/main" val="2717148640"/>
+                  </a:ext>
+                </a:extLst>
+              </a:tr>
+              <a:tr h="370840">
+                <a:tc>
+                  <a:txBody>
+                    <a:bodyPr/>
+                    <a:lstStyle/>
+                    <a:p>
+                      <a:r>
+                        <a:rPr lang="en-US" dirty="0" err="1"/>
+                        <a:t>Nu_b</a:t>
+                      </a:r>
+                      <a:endParaRPr lang="en-US" dirty="0"/>
+                    </a:p>
+                  </a:txBody>
+                  <a:tcPr/>
+                </a:tc>
+                <a:tc>
+                  <a:txBody>
+                    <a:bodyPr/>
+                    <a:lstStyle/>
+                    <a:p>
+                      <a:r>
+                        <a:rPr lang="en-US" dirty="0"/>
+                        <a:t>N/A</a:t>
+                      </a:r>
+                    </a:p>
+                  </a:txBody>
+                  <a:tcPr/>
+                </a:tc>
+                <a:tc>
+                  <a:txBody>
+                    <a:bodyPr/>
+                    <a:lstStyle/>
+                    <a:p>
+                      <a:r>
+                        <a:rPr lang="en-US" dirty="0"/>
+                        <a:t>N/A</a:t>
+                      </a:r>
+                    </a:p>
+                  </a:txBody>
+                  <a:tcPr/>
+                </a:tc>
+                <a:tc>
+                  <a:txBody>
+                    <a:bodyPr/>
+                    <a:lstStyle/>
+                    <a:p>
+                      <a:r>
+                        <a:rPr lang="en-US" dirty="0">
+                          <a:solidFill>
+                            <a:srgbClr val="FF0000"/>
+                          </a:solidFill>
+                        </a:rPr>
+                        <a:t>2.93160455e-01</a:t>
+                      </a:r>
+                    </a:p>
+                  </a:txBody>
+                  <a:tcPr/>
+                </a:tc>
+                <a:tc>
+                  <a:txBody>
+                    <a:bodyPr/>
+                    <a:lstStyle/>
+                    <a:p>
+                      <a:r>
+                        <a:rPr lang="en-US" sz="1800" kern="1200" dirty="0">
+                          <a:solidFill>
+                            <a:srgbClr val="FF0000"/>
+                          </a:solidFill>
+                          <a:latin typeface="+mn-lt"/>
+                          <a:ea typeface="+mn-ea"/>
+                          <a:cs typeface="+mn-cs"/>
+                        </a:rPr>
+                        <a:t>0.749287</a:t>
+                      </a:r>
+                      <a:endParaRPr lang="en-US" dirty="0">
+                        <a:solidFill>
+                          <a:srgbClr val="FF0000"/>
+                        </a:solidFill>
+                      </a:endParaRPr>
+                    </a:p>
+                  </a:txBody>
+                  <a:tcPr/>
+                </a:tc>
+                <a:extLst>
+                  <a:ext uri="{0D108BD9-81ED-4DB2-BD59-A6C34878D82A}">
+                    <a16:rowId xmlns:a16="http://schemas.microsoft.com/office/drawing/2014/main" val="3992781458"/>
+                  </a:ext>
+                </a:extLst>
+              </a:tr>
+              <a:tr h="370840">
+                <a:tc>
+                  <a:txBody>
+                    <a:bodyPr/>
+                    <a:lstStyle/>
+                    <a:p>
+                      <a:r>
+                        <a:rPr lang="en-US" dirty="0"/>
+                        <a:t>T_12</a:t>
+                      </a:r>
+                    </a:p>
+                  </a:txBody>
+                  <a:tcPr/>
+                </a:tc>
+                <a:tc>
+                  <a:txBody>
+                    <a:bodyPr/>
+                    <a:lstStyle/>
+                    <a:p>
+                      <a:r>
+                        <a:rPr lang="en-US" dirty="0"/>
+                        <a:t>27.47992853</a:t>
+                      </a:r>
+                    </a:p>
+                  </a:txBody>
+                  <a:tcPr/>
+                </a:tc>
+                <a:tc>
+                  <a:txBody>
+                    <a:bodyPr/>
+                    <a:lstStyle/>
+                    <a:p>
+                      <a:r>
+                        <a:rPr lang="en-US" dirty="0"/>
+                        <a:t>5.26353859</a:t>
+                      </a:r>
+                    </a:p>
+                  </a:txBody>
+                  <a:tcPr/>
+                </a:tc>
+                <a:tc>
+                  <a:txBody>
+                    <a:bodyPr/>
+                    <a:lstStyle/>
+                    <a:p>
+                      <a:r>
+                        <a:rPr lang="en-US" dirty="0">
+                          <a:solidFill>
+                            <a:srgbClr val="FF0000"/>
+                          </a:solidFill>
+                        </a:rPr>
+                        <a:t>2.67384328e-09</a:t>
+                      </a:r>
+                    </a:p>
+                  </a:txBody>
+                  <a:tcPr/>
+                </a:tc>
+                <a:tc>
+                  <a:txBody>
+                    <a:bodyPr/>
+                    <a:lstStyle/>
+                    <a:p>
+                      <a:r>
+                        <a:rPr lang="en-US" sz="1800" kern="1200" dirty="0">
+                          <a:solidFill>
+                            <a:srgbClr val="FF0000"/>
+                          </a:solidFill>
+                          <a:latin typeface="+mn-lt"/>
+                          <a:ea typeface="+mn-ea"/>
+                          <a:cs typeface="+mn-cs"/>
+                        </a:rPr>
+                        <a:t>0.17426896</a:t>
+                      </a:r>
+                      <a:endParaRPr lang="en-US" dirty="0">
+                        <a:solidFill>
+                          <a:srgbClr val="FF0000"/>
+                        </a:solidFill>
+                      </a:endParaRPr>
+                    </a:p>
+                  </a:txBody>
+                  <a:tcPr/>
+                </a:tc>
+                <a:extLst>
+                  <a:ext uri="{0D108BD9-81ED-4DB2-BD59-A6C34878D82A}">
+                    <a16:rowId xmlns:a16="http://schemas.microsoft.com/office/drawing/2014/main" val="3283572519"/>
+                  </a:ext>
+                </a:extLst>
+              </a:tr>
+              <a:tr h="370840">
+                <a:tc>
+                  <a:txBody>
+                    <a:bodyPr/>
+                    <a:lstStyle/>
+                    <a:p>
+                      <a:r>
+                        <a:rPr lang="en-US" dirty="0"/>
+                        <a:t>T_23</a:t>
+                      </a:r>
+                    </a:p>
+                  </a:txBody>
+                  <a:tcPr/>
+                </a:tc>
+                <a:tc>
+                  <a:txBody>
+                    <a:bodyPr/>
+                    <a:lstStyle/>
+                    <a:p>
+                      <a:r>
+                        <a:rPr lang="en-US" dirty="0"/>
+                        <a:t>N/A</a:t>
+                      </a:r>
+                    </a:p>
+                  </a:txBody>
+                  <a:tcPr/>
+                </a:tc>
+                <a:tc>
+                  <a:txBody>
+                    <a:bodyPr/>
+                    <a:lstStyle/>
+                    <a:p>
+                      <a:r>
+                        <a:rPr lang="en-US" dirty="0"/>
+                        <a:t>N/A</a:t>
+                      </a:r>
+                    </a:p>
+                  </a:txBody>
+                  <a:tcPr/>
+                </a:tc>
+                <a:tc>
+                  <a:txBody>
+                    <a:bodyPr/>
+                    <a:lstStyle/>
+                    <a:p>
+                      <a:r>
+                        <a:rPr lang="en-US" dirty="0">
+                          <a:solidFill>
+                            <a:srgbClr val="FF0000"/>
+                          </a:solidFill>
+                        </a:rPr>
+                        <a:t>N/A</a:t>
+                      </a:r>
+                    </a:p>
+                  </a:txBody>
+                  <a:tcPr/>
+                </a:tc>
+                <a:tc>
+                  <a:txBody>
+                    <a:bodyPr/>
+                    <a:lstStyle/>
+                    <a:p>
+                      <a:r>
+                        <a:rPr lang="en-US" sz="1800" kern="1200" dirty="0">
+                          <a:solidFill>
+                            <a:srgbClr val="FF0000"/>
+                          </a:solidFill>
+                          <a:latin typeface="+mn-lt"/>
+                          <a:ea typeface="+mn-ea"/>
+                          <a:cs typeface="+mn-cs"/>
+                        </a:rPr>
+                        <a:t>0.09401605</a:t>
+                      </a:r>
+                      <a:endParaRPr lang="en-US" dirty="0">
+                        <a:solidFill>
+                          <a:srgbClr val="FF0000"/>
+                        </a:solidFill>
+                      </a:endParaRPr>
+                    </a:p>
+                  </a:txBody>
+                  <a:tcPr/>
+                </a:tc>
+                <a:extLst>
+                  <a:ext uri="{0D108BD9-81ED-4DB2-BD59-A6C34878D82A}">
+                    <a16:rowId xmlns:a16="http://schemas.microsoft.com/office/drawing/2014/main" val="2422470866"/>
+                  </a:ext>
+                </a:extLst>
+              </a:tr>
+            </a:tbl>
+          </a:graphicData>
+        </a:graphic>
+      </p:graphicFrame>
+      <p:sp>
+        <p:nvSpPr>
+          <p:cNvPr id="6" name="TextBox 5">
+            <a:extLst>
+              <a:ext uri="{FF2B5EF4-FFF2-40B4-BE49-F238E27FC236}">
+                <a16:creationId xmlns:a16="http://schemas.microsoft.com/office/drawing/2014/main" id="{7419C400-D799-4ACD-BC31-78961011E4A8}"/>
+              </a:ext>
+            </a:extLst>
+          </p:cNvPr>
+          <p:cNvSpPr txBox="1"/>
+          <p:nvPr/>
+        </p:nvSpPr>
+        <p:spPr>
+          <a:xfrm>
+            <a:off x="7096453" y="1690688"/>
+            <a:ext cx="5095547" cy="1754326"/>
+          </a:xfrm>
+          <a:prstGeom prst="rect">
+            <a:avLst/>
+          </a:prstGeom>
+          <a:noFill/>
+        </p:spPr>
+        <p:txBody>
+          <a:bodyPr wrap="square" rtlCol="0">
+            <a:spAutoFit/>
+          </a:bodyPr>
+          <a:lstStyle/>
+          <a:p>
+            <a:pPr marL="285750" indent="-285750">
+              <a:buFont typeface="Arial" panose="020B0604020202020204" pitchFamily="34" charset="0"/>
+              <a:buChar char="•"/>
+            </a:pPr>
+            <a:r>
+              <a:rPr lang="en-US" dirty="0" err="1"/>
+              <a:t>Nu_a</a:t>
+            </a:r>
+            <a:r>
+              <a:rPr lang="en-US" dirty="0"/>
+              <a:t>: contemporary population relative to ancestral population before first epoch</a:t>
+            </a:r>
+          </a:p>
+          <a:p>
+            <a:pPr marL="285750" indent="-285750">
+              <a:buFont typeface="Arial" panose="020B0604020202020204" pitchFamily="34" charset="0"/>
+              <a:buChar char="•"/>
+            </a:pPr>
+            <a:r>
+              <a:rPr lang="en-US" dirty="0" err="1"/>
+              <a:t>Nu_b</a:t>
+            </a:r>
+            <a:r>
+              <a:rPr lang="en-US" dirty="0"/>
+              <a:t>: contemporary population relative to ancestral population before second epoch</a:t>
+            </a:r>
+          </a:p>
+          <a:p>
+            <a:pPr marL="285750" indent="-285750">
+              <a:buFont typeface="Arial" panose="020B0604020202020204" pitchFamily="34" charset="0"/>
+              <a:buChar char="•"/>
+            </a:pPr>
+            <a:r>
+              <a:rPr lang="en-US" dirty="0"/>
+              <a:t>T_1: Duration of first epoch (units of 2 * </a:t>
+            </a:r>
+            <a:r>
+              <a:rPr lang="en-US" dirty="0" err="1"/>
+              <a:t>N_a</a:t>
+            </a:r>
+            <a:r>
+              <a:rPr lang="en-US" dirty="0"/>
+              <a:t>)</a:t>
+            </a:r>
+          </a:p>
+          <a:p>
+            <a:pPr marL="285750" indent="-285750">
+              <a:buFont typeface="Arial" panose="020B0604020202020204" pitchFamily="34" charset="0"/>
+              <a:buChar char="•"/>
+            </a:pPr>
+            <a:r>
+              <a:rPr lang="en-US" dirty="0"/>
+              <a:t>T_2: Duration of second epoch (units of 2 * </a:t>
+            </a:r>
+            <a:r>
+              <a:rPr lang="en-US" dirty="0" err="1"/>
+              <a:t>N_a</a:t>
+            </a:r>
+            <a:r>
+              <a:rPr lang="en-US" dirty="0"/>
+              <a:t>)</a:t>
+            </a:r>
+          </a:p>
+        </p:txBody>
+      </p:sp>
     </p:spTree>
     <p:extLst>
       <p:ext uri="{BB962C8B-B14F-4D97-AF65-F5344CB8AC3E}">
-        <p14:creationId xmlns:p14="http://schemas.microsoft.com/office/powerpoint/2010/main" val="4212762637"/>
+        <p14:creationId xmlns:p14="http://schemas.microsoft.com/office/powerpoint/2010/main" val="151847977"/>
       </p:ext>
     </p:extLst>
   </p:cSld>

</xml_diff>